<commit_message>
Working on session #3
</commit_message>
<xml_diff>
--- a/html/presentations/CoderDojoBrayHTML_session1.pptx
+++ b/html/presentations/CoderDojoBrayHTML_session1.pptx
@@ -5,7 +5,7 @@
     <p:sldMasterId id="2147483672" r:id="rId1"/>
   </p:sldMasterIdLst>
   <p:notesMasterIdLst>
-    <p:notesMasterId r:id="rId12"/>
+    <p:notesMasterId r:id="rId13"/>
   </p:notesMasterIdLst>
   <p:sldIdLst>
     <p:sldId id="256" r:id="rId2"/>
@@ -18,6 +18,7 @@
     <p:sldId id="263" r:id="rId9"/>
     <p:sldId id="264" r:id="rId10"/>
     <p:sldId id="265" r:id="rId11"/>
+    <p:sldId id="266" r:id="rId12"/>
   </p:sldIdLst>
   <p:sldSz cx="9144000" cy="6858000" type="screen4x3"/>
   <p:notesSz cx="6858000" cy="9144000"/>
@@ -201,7 +202,7 @@
           <a:p>
             <a:fld id="{9650A110-E0B9-45FC-A343-D8EC5640BF3F}" type="datetimeFigureOut">
               <a:rPr lang="en-IE" smtClean="0"/>
-              <a:t>26/07/2012</a:t>
+              <a:t>10/09/2012</a:t>
             </a:fld>
             <a:endParaRPr lang="en-IE"/>
           </a:p>
@@ -553,6 +554,90 @@
 </p:notes>
 </file>
 
+<file path=ppt/notesSlides/notesSlide10.xml><?xml version="1.0" encoding="utf-8"?>
+<p:notes xmlns:a="http://schemas.openxmlformats.org/drawingml/2006/main" xmlns:r="http://schemas.openxmlformats.org/officeDocument/2006/relationships" xmlns:p="http://schemas.openxmlformats.org/presentationml/2006/main">
+  <p:cSld>
+    <p:spTree>
+      <p:nvGrpSpPr>
+        <p:cNvPr id="1" name=""/>
+        <p:cNvGrpSpPr/>
+        <p:nvPr/>
+      </p:nvGrpSpPr>
+      <p:grpSpPr>
+        <a:xfrm>
+          <a:off x="0" y="0"/>
+          <a:ext cx="0" cy="0"/>
+          <a:chOff x="0" y="0"/>
+          <a:chExt cx="0" cy="0"/>
+        </a:xfrm>
+      </p:grpSpPr>
+      <p:sp>
+        <p:nvSpPr>
+          <p:cNvPr id="2" name="Slide Image Placeholder 1"/>
+          <p:cNvSpPr>
+            <a:spLocks noGrp="1" noRot="1" noChangeAspect="1"/>
+          </p:cNvSpPr>
+          <p:nvPr>
+            <p:ph type="sldImg"/>
+          </p:nvPr>
+        </p:nvSpPr>
+        <p:spPr/>
+      </p:sp>
+      <p:sp>
+        <p:nvSpPr>
+          <p:cNvPr id="3" name="Notes Placeholder 2"/>
+          <p:cNvSpPr>
+            <a:spLocks noGrp="1"/>
+          </p:cNvSpPr>
+          <p:nvPr>
+            <p:ph type="body" idx="1"/>
+          </p:nvPr>
+        </p:nvSpPr>
+        <p:spPr/>
+        <p:txBody>
+          <a:bodyPr/>
+          <a:lstStyle/>
+          <a:p>
+            <a:endParaRPr lang="en-IE" baseline="0" dirty="0" smtClean="0"/>
+          </a:p>
+        </p:txBody>
+      </p:sp>
+      <p:sp>
+        <p:nvSpPr>
+          <p:cNvPr id="4" name="Slide Number Placeholder 3"/>
+          <p:cNvSpPr>
+            <a:spLocks noGrp="1"/>
+          </p:cNvSpPr>
+          <p:nvPr>
+            <p:ph type="sldNum" sz="quarter" idx="10"/>
+          </p:nvPr>
+        </p:nvSpPr>
+        <p:spPr/>
+        <p:txBody>
+          <a:bodyPr/>
+          <a:lstStyle/>
+          <a:p>
+            <a:fld id="{ABE5CB41-8F34-4FAE-BDD8-10A032863583}" type="slidenum">
+              <a:rPr lang="en-IE" smtClean="0"/>
+              <a:t>11</a:t>
+            </a:fld>
+            <a:endParaRPr lang="en-IE"/>
+          </a:p>
+        </p:txBody>
+      </p:sp>
+    </p:spTree>
+    <p:extLst>
+      <p:ext uri="{BB962C8B-B14F-4D97-AF65-F5344CB8AC3E}">
+        <p14:creationId xmlns:p14="http://schemas.microsoft.com/office/powerpoint/2010/main" val="2154761357"/>
+      </p:ext>
+    </p:extLst>
+  </p:cSld>
+  <p:clrMapOvr>
+    <a:masterClrMapping/>
+  </p:clrMapOvr>
+</p:notes>
+</file>
+
 <file path=ppt/notesSlides/notesSlide2.xml><?xml version="1.0" encoding="utf-8"?>
 <p:notes xmlns:a="http://schemas.openxmlformats.org/drawingml/2006/main" xmlns:r="http://schemas.openxmlformats.org/officeDocument/2006/relationships" xmlns:p="http://schemas.openxmlformats.org/presentationml/2006/main">
   <p:cSld>
@@ -2127,7 +2212,7 @@
           <a:p>
             <a:fld id="{6D57282B-8A94-4CFA-A812-B2453AD9C772}" type="datetimeFigureOut">
               <a:rPr lang="en-IE" smtClean="0"/>
-              <a:t>26/07/2012</a:t>
+              <a:t>10/09/2012</a:t>
             </a:fld>
             <a:endParaRPr lang="en-IE" dirty="0"/>
           </a:p>
@@ -2350,7 +2435,7 @@
           <a:p>
             <a:fld id="{6D57282B-8A94-4CFA-A812-B2453AD9C772}" type="datetimeFigureOut">
               <a:rPr lang="en-IE" smtClean="0"/>
-              <a:t>26/07/2012</a:t>
+              <a:t>10/09/2012</a:t>
             </a:fld>
             <a:endParaRPr lang="en-IE"/>
           </a:p>
@@ -2630,7 +2715,7 @@
           <a:p>
             <a:fld id="{6D57282B-8A94-4CFA-A812-B2453AD9C772}" type="datetimeFigureOut">
               <a:rPr lang="en-IE" smtClean="0"/>
-              <a:t>26/07/2012</a:t>
+              <a:t>10/09/2012</a:t>
             </a:fld>
             <a:endParaRPr lang="en-IE"/>
           </a:p>
@@ -2809,7 +2894,7 @@
           <a:p>
             <a:fld id="{6D57282B-8A94-4CFA-A812-B2453AD9C772}" type="datetimeFigureOut">
               <a:rPr lang="en-IE" smtClean="0"/>
-              <a:t>26/07/2012</a:t>
+              <a:t>10/09/2012</a:t>
             </a:fld>
             <a:endParaRPr lang="en-IE"/>
           </a:p>
@@ -3203,7 +3288,7 @@
           <a:p>
             <a:fld id="{6D57282B-8A94-4CFA-A812-B2453AD9C772}" type="datetimeFigureOut">
               <a:rPr lang="en-IE" smtClean="0"/>
-              <a:t>26/07/2012</a:t>
+              <a:t>10/09/2012</a:t>
             </a:fld>
             <a:endParaRPr lang="en-IE"/>
           </a:p>
@@ -3490,7 +3575,7 @@
           <a:p>
             <a:fld id="{6D57282B-8A94-4CFA-A812-B2453AD9C772}" type="datetimeFigureOut">
               <a:rPr lang="en-IE" smtClean="0"/>
-              <a:t>26/07/2012</a:t>
+              <a:t>10/09/2012</a:t>
             </a:fld>
             <a:endParaRPr lang="en-IE"/>
           </a:p>
@@ -3912,7 +3997,7 @@
           <a:p>
             <a:fld id="{6D57282B-8A94-4CFA-A812-B2453AD9C772}" type="datetimeFigureOut">
               <a:rPr lang="en-IE" smtClean="0"/>
-              <a:t>26/07/2012</a:t>
+              <a:t>10/09/2012</a:t>
             </a:fld>
             <a:endParaRPr lang="en-IE"/>
           </a:p>
@@ -4027,7 +4112,7 @@
           <a:p>
             <a:fld id="{6D57282B-8A94-4CFA-A812-B2453AD9C772}" type="datetimeFigureOut">
               <a:rPr lang="en-IE" smtClean="0"/>
-              <a:t>26/07/2012</a:t>
+              <a:t>10/09/2012</a:t>
             </a:fld>
             <a:endParaRPr lang="en-IE"/>
           </a:p>
@@ -4117,7 +4202,7 @@
           <a:p>
             <a:fld id="{6D57282B-8A94-4CFA-A812-B2453AD9C772}" type="datetimeFigureOut">
               <a:rPr lang="en-IE" smtClean="0"/>
-              <a:t>26/07/2012</a:t>
+              <a:t>10/09/2012</a:t>
             </a:fld>
             <a:endParaRPr lang="en-IE"/>
           </a:p>
@@ -4395,7 +4480,7 @@
           <a:p>
             <a:fld id="{6D57282B-8A94-4CFA-A812-B2453AD9C772}" type="datetimeFigureOut">
               <a:rPr lang="en-IE" smtClean="0"/>
-              <a:t>26/07/2012</a:t>
+              <a:t>10/09/2012</a:t>
             </a:fld>
             <a:endParaRPr lang="en-IE"/>
           </a:p>
@@ -4756,7 +4841,7 @@
           <a:p>
             <a:fld id="{6D57282B-8A94-4CFA-A812-B2453AD9C772}" type="datetimeFigureOut">
               <a:rPr lang="en-IE" smtClean="0"/>
-              <a:t>26/07/2012</a:t>
+              <a:t>10/09/2012</a:t>
             </a:fld>
             <a:endParaRPr lang="en-IE"/>
           </a:p>
@@ -5193,7 +5278,7 @@
           <a:p>
             <a:fld id="{6D57282B-8A94-4CFA-A812-B2453AD9C772}" type="datetimeFigureOut">
               <a:rPr lang="en-IE" smtClean="0"/>
-              <a:t>26/07/2012</a:t>
+              <a:t>10/09/2012</a:t>
             </a:fld>
             <a:endParaRPr lang="en-IE"/>
           </a:p>
@@ -5789,7 +5874,7 @@
         <p:spPr/>
         <p:txBody>
           <a:bodyPr>
-            <a:normAutofit fontScale="92500" lnSpcReduction="10000"/>
+            <a:normAutofit fontScale="92500" lnSpcReduction="20000"/>
           </a:bodyPr>
           <a:lstStyle/>
           <a:p>
@@ -5843,8 +5928,13 @@
             </a:pPr>
             <a:r>
               <a:rPr lang="en-IE" dirty="0" smtClean="0"/>
-              <a:t>Share your pages with others (Thimble)</a:t>
-            </a:r>
+              <a:t>Send us links to your HTML pages at </a:t>
+            </a:r>
+            <a:r>
+              <a:rPr lang="en-IE" b="1" dirty="0" smtClean="0"/>
+              <a:t>bray@coderdojo.com</a:t>
+            </a:r>
+            <a:endParaRPr lang="en-IE" b="1" dirty="0" smtClean="0"/>
           </a:p>
           <a:p>
             <a:pPr marL="118872" indent="0">
@@ -5873,6 +5963,129 @@
     <p:extLst>
       <p:ext uri="{BB962C8B-B14F-4D97-AF65-F5344CB8AC3E}">
         <p14:creationId xmlns:p14="http://schemas.microsoft.com/office/powerpoint/2010/main" val="3785644732"/>
+      </p:ext>
+    </p:extLst>
+  </p:cSld>
+  <p:clrMapOvr>
+    <a:masterClrMapping/>
+  </p:clrMapOvr>
+  <p:timing>
+    <p:tnLst>
+      <p:par>
+        <p:cTn id="1" dur="indefinite" restart="never" nodeType="tmRoot"/>
+      </p:par>
+    </p:tnLst>
+  </p:timing>
+</p:sld>
+</file>
+
+<file path=ppt/slides/slide11.xml><?xml version="1.0" encoding="utf-8"?>
+<p:sld xmlns:a="http://schemas.openxmlformats.org/drawingml/2006/main" xmlns:r="http://schemas.openxmlformats.org/officeDocument/2006/relationships" xmlns:p="http://schemas.openxmlformats.org/presentationml/2006/main">
+  <p:cSld>
+    <p:spTree>
+      <p:nvGrpSpPr>
+        <p:cNvPr id="1" name=""/>
+        <p:cNvGrpSpPr/>
+        <p:nvPr/>
+      </p:nvGrpSpPr>
+      <p:grpSpPr>
+        <a:xfrm>
+          <a:off x="0" y="0"/>
+          <a:ext cx="0" cy="0"/>
+          <a:chOff x="0" y="0"/>
+          <a:chExt cx="0" cy="0"/>
+        </a:xfrm>
+      </p:grpSpPr>
+      <p:sp>
+        <p:nvSpPr>
+          <p:cNvPr id="2" name="Title 1"/>
+          <p:cNvSpPr>
+            <a:spLocks noGrp="1"/>
+          </p:cNvSpPr>
+          <p:nvPr>
+            <p:ph type="title"/>
+          </p:nvPr>
+        </p:nvSpPr>
+        <p:spPr/>
+        <p:txBody>
+          <a:bodyPr/>
+          <a:lstStyle/>
+          <a:p>
+            <a:r>
+              <a:rPr lang="en-IE" dirty="0" smtClean="0"/>
+              <a:t>Next Week …</a:t>
+            </a:r>
+            <a:endParaRPr lang="en-IE" dirty="0"/>
+          </a:p>
+        </p:txBody>
+      </p:sp>
+      <p:sp>
+        <p:nvSpPr>
+          <p:cNvPr id="3" name="Content Placeholder 2"/>
+          <p:cNvSpPr>
+            <a:spLocks noGrp="1"/>
+          </p:cNvSpPr>
+          <p:nvPr>
+            <p:ph idx="1"/>
+          </p:nvPr>
+        </p:nvSpPr>
+        <p:spPr/>
+        <p:txBody>
+          <a:bodyPr>
+            <a:normAutofit/>
+          </a:bodyPr>
+          <a:lstStyle/>
+          <a:p>
+            <a:pPr marL="118872" indent="0">
+              <a:buNone/>
+            </a:pPr>
+            <a:r>
+              <a:rPr lang="en-IE" dirty="0" smtClean="0"/>
+              <a:t>Next week:</a:t>
+            </a:r>
+          </a:p>
+          <a:p>
+            <a:pPr marL="118872" indent="0">
+              <a:buNone/>
+            </a:pPr>
+            <a:endParaRPr lang="en-IE" dirty="0" smtClean="0"/>
+          </a:p>
+          <a:p>
+            <a:r>
+              <a:rPr lang="en-US" dirty="0" smtClean="0"/>
+              <a:t>We’ll look at some HTML tables and lists</a:t>
+            </a:r>
+          </a:p>
+          <a:p>
+            <a:r>
+              <a:rPr lang="en-US" dirty="0" smtClean="0"/>
+              <a:t>We’ll look at linking several web pages together into a website</a:t>
+            </a:r>
+          </a:p>
+          <a:p>
+            <a:r>
+              <a:rPr lang="en-US" dirty="0" smtClean="0"/>
+              <a:t>We’ll start to look a bit more at CSS</a:t>
+            </a:r>
+          </a:p>
+          <a:p>
+            <a:endParaRPr lang="en-US" dirty="0"/>
+          </a:p>
+          <a:p>
+            <a:endParaRPr lang="en-IE" dirty="0" smtClean="0"/>
+          </a:p>
+          <a:p>
+            <a:pPr marL="118872" indent="0">
+              <a:buNone/>
+            </a:pPr>
+            <a:endParaRPr lang="en-IE" sz="2800" dirty="0" smtClean="0"/>
+          </a:p>
+        </p:txBody>
+      </p:sp>
+    </p:spTree>
+    <p:extLst>
+      <p:ext uri="{BB962C8B-B14F-4D97-AF65-F5344CB8AC3E}">
+        <p14:creationId xmlns:p14="http://schemas.microsoft.com/office/powerpoint/2010/main" val="943454238"/>
       </p:ext>
     </p:extLst>
   </p:cSld>

</xml_diff>

<commit_message>
Session #3 HTML/CSS mostly done. Nice looking CSS-based menu, step-by-step. Placeholder for the .ppt
</commit_message>
<xml_diff>
--- a/html/presentations/CoderDojoBrayHTML_session1.pptx
+++ b/html/presentations/CoderDojoBrayHTML_session1.pptx
@@ -5,20 +5,21 @@
     <p:sldMasterId id="2147483672" r:id="rId1"/>
   </p:sldMasterIdLst>
   <p:notesMasterIdLst>
-    <p:notesMasterId r:id="rId13"/>
+    <p:notesMasterId r:id="rId14"/>
   </p:notesMasterIdLst>
   <p:sldIdLst>
     <p:sldId id="256" r:id="rId2"/>
-    <p:sldId id="257" r:id="rId3"/>
-    <p:sldId id="258" r:id="rId4"/>
-    <p:sldId id="259" r:id="rId5"/>
-    <p:sldId id="260" r:id="rId6"/>
-    <p:sldId id="261" r:id="rId7"/>
-    <p:sldId id="262" r:id="rId8"/>
-    <p:sldId id="263" r:id="rId9"/>
-    <p:sldId id="264" r:id="rId10"/>
-    <p:sldId id="265" r:id="rId11"/>
-    <p:sldId id="266" r:id="rId12"/>
+    <p:sldId id="267" r:id="rId3"/>
+    <p:sldId id="257" r:id="rId4"/>
+    <p:sldId id="258" r:id="rId5"/>
+    <p:sldId id="259" r:id="rId6"/>
+    <p:sldId id="260" r:id="rId7"/>
+    <p:sldId id="261" r:id="rId8"/>
+    <p:sldId id="262" r:id="rId9"/>
+    <p:sldId id="263" r:id="rId10"/>
+    <p:sldId id="264" r:id="rId11"/>
+    <p:sldId id="265" r:id="rId12"/>
+    <p:sldId id="266" r:id="rId13"/>
   </p:sldIdLst>
   <p:sldSz cx="9144000" cy="6858000" type="screen4x3"/>
   <p:notesSz cx="6858000" cy="9144000"/>
@@ -202,7 +203,7 @@
           <a:p>
             <a:fld id="{9650A110-E0B9-45FC-A343-D8EC5640BF3F}" type="datetimeFigureOut">
               <a:rPr lang="en-IE" smtClean="0"/>
-              <a:t>10/09/2012</a:t>
+              <a:t>12/09/2012</a:t>
             </a:fld>
             <a:endParaRPr lang="en-IE"/>
           </a:p>
@@ -535,7 +536,7 @@
           <a:p>
             <a:fld id="{ABE5CB41-8F34-4FAE-BDD8-10A032863583}" type="slidenum">
               <a:rPr lang="en-IE" smtClean="0"/>
-              <a:t>2</a:t>
+              <a:t>1</a:t>
             </a:fld>
             <a:endParaRPr lang="en-IE"/>
           </a:p>
@@ -544,7 +545,7 @@
     </p:spTree>
     <p:extLst>
       <p:ext uri="{BB962C8B-B14F-4D97-AF65-F5344CB8AC3E}">
-        <p14:creationId xmlns:p14="http://schemas.microsoft.com/office/powerpoint/2010/main" val="2067379537"/>
+        <p14:creationId xmlns:p14="http://schemas.microsoft.com/office/powerpoint/2010/main" val="2957290348"/>
       </p:ext>
     </p:extLst>
   </p:cSld>
@@ -598,6 +599,178 @@
           <a:bodyPr/>
           <a:lstStyle/>
           <a:p>
+            <a:r>
+              <a:rPr lang="en-IE" baseline="0" dirty="0" smtClean="0"/>
+              <a:t>The easiest way to publish is to use Mozilla Thimble: this gives them a URL they can share with their granny.</a:t>
+            </a:r>
+          </a:p>
+          <a:p>
+            <a:endParaRPr lang="en-IE" baseline="0" dirty="0" smtClean="0"/>
+          </a:p>
+          <a:p>
+            <a:r>
+              <a:rPr lang="en-IE" baseline="0" dirty="0" smtClean="0"/>
+              <a:t>This will work fine, if the </a:t>
+            </a:r>
+            <a:r>
+              <a:rPr lang="en-IE" baseline="0" dirty="0" err="1" smtClean="0"/>
+              <a:t>WiFi</a:t>
+            </a:r>
+            <a:r>
+              <a:rPr lang="en-IE" baseline="0" dirty="0" smtClean="0"/>
+              <a:t> holds </a:t>
+            </a:r>
+            <a:r>
+              <a:rPr lang="en-IE" baseline="0" dirty="0" smtClean="0"/>
+              <a:t>up</a:t>
+            </a:r>
+          </a:p>
+          <a:p>
+            <a:endParaRPr lang="en-IE" baseline="0" dirty="0" smtClean="0"/>
+          </a:p>
+          <a:p>
+            <a:r>
+              <a:rPr lang="en-IE" baseline="0" dirty="0" smtClean="0"/>
+              <a:t>There </a:t>
+            </a:r>
+            <a:r>
+              <a:rPr lang="en-IE" baseline="0" dirty="0" smtClean="0"/>
+              <a:t>is also </a:t>
+            </a:r>
+            <a:r>
+              <a:rPr lang="en-IE" baseline="0" dirty="0" smtClean="0"/>
+              <a:t>an issue that Thimble </a:t>
+            </a:r>
+            <a:r>
+              <a:rPr lang="en-IE" baseline="0" dirty="0" smtClean="0"/>
+              <a:t>sometimes throttles </a:t>
+            </a:r>
+            <a:r>
+              <a:rPr lang="en-IE" baseline="0" dirty="0" smtClean="0"/>
+              <a:t>site creation from the same IP address: </a:t>
+            </a:r>
+            <a:r>
+              <a:rPr lang="en-IE" baseline="0" dirty="0" smtClean="0"/>
+              <a:t>we’re </a:t>
+            </a:r>
+            <a:r>
+              <a:rPr lang="en-IE" baseline="0" dirty="0" err="1" smtClean="0"/>
+              <a:t>behing</a:t>
+            </a:r>
+            <a:r>
+              <a:rPr lang="en-IE" baseline="0" dirty="0" smtClean="0"/>
+              <a:t> our own NAT </a:t>
+            </a:r>
+            <a:r>
+              <a:rPr lang="en-IE" baseline="0" dirty="0" smtClean="0"/>
+              <a:t>and so appear to be from a single IP address … so they </a:t>
+            </a:r>
+            <a:r>
+              <a:rPr lang="en-IE" baseline="0" dirty="0" smtClean="0"/>
+              <a:t>may </a:t>
+            </a:r>
+            <a:r>
+              <a:rPr lang="en-IE" baseline="0" dirty="0" smtClean="0"/>
+              <a:t>have to retry.</a:t>
+            </a:r>
+          </a:p>
+          <a:p>
+            <a:endParaRPr lang="en-IE" baseline="0" dirty="0" smtClean="0"/>
+          </a:p>
+          <a:p>
+            <a:r>
+              <a:rPr lang="en-IE" baseline="0" dirty="0" smtClean="0"/>
+              <a:t>Thimble also does not work well with some versions of IE which have some security settings turned on.</a:t>
+            </a:r>
+          </a:p>
+          <a:p>
+            <a:r>
+              <a:rPr lang="en-IE" baseline="0" dirty="0" smtClean="0"/>
+              <a:t>For this and other reasons it would be best if everyone used Chrome as their browser.</a:t>
+            </a:r>
+          </a:p>
+        </p:txBody>
+      </p:sp>
+      <p:sp>
+        <p:nvSpPr>
+          <p:cNvPr id="4" name="Slide Number Placeholder 3"/>
+          <p:cNvSpPr>
+            <a:spLocks noGrp="1"/>
+          </p:cNvSpPr>
+          <p:nvPr>
+            <p:ph type="sldNum" sz="quarter" idx="10"/>
+          </p:nvPr>
+        </p:nvSpPr>
+        <p:spPr/>
+        <p:txBody>
+          <a:bodyPr/>
+          <a:lstStyle/>
+          <a:p>
+            <a:fld id="{ABE5CB41-8F34-4FAE-BDD8-10A032863583}" type="slidenum">
+              <a:rPr lang="en-IE" smtClean="0"/>
+              <a:t>10</a:t>
+            </a:fld>
+            <a:endParaRPr lang="en-IE"/>
+          </a:p>
+        </p:txBody>
+      </p:sp>
+    </p:spTree>
+    <p:extLst>
+      <p:ext uri="{BB962C8B-B14F-4D97-AF65-F5344CB8AC3E}">
+        <p14:creationId xmlns:p14="http://schemas.microsoft.com/office/powerpoint/2010/main" val="2154761357"/>
+      </p:ext>
+    </p:extLst>
+  </p:cSld>
+  <p:clrMapOvr>
+    <a:masterClrMapping/>
+  </p:clrMapOvr>
+</p:notes>
+</file>
+
+<file path=ppt/notesSlides/notesSlide11.xml><?xml version="1.0" encoding="utf-8"?>
+<p:notes xmlns:a="http://schemas.openxmlformats.org/drawingml/2006/main" xmlns:r="http://schemas.openxmlformats.org/officeDocument/2006/relationships" xmlns:p="http://schemas.openxmlformats.org/presentationml/2006/main">
+  <p:cSld>
+    <p:spTree>
+      <p:nvGrpSpPr>
+        <p:cNvPr id="1" name=""/>
+        <p:cNvGrpSpPr/>
+        <p:nvPr/>
+      </p:nvGrpSpPr>
+      <p:grpSpPr>
+        <a:xfrm>
+          <a:off x="0" y="0"/>
+          <a:ext cx="0" cy="0"/>
+          <a:chOff x="0" y="0"/>
+          <a:chExt cx="0" cy="0"/>
+        </a:xfrm>
+      </p:grpSpPr>
+      <p:sp>
+        <p:nvSpPr>
+          <p:cNvPr id="2" name="Slide Image Placeholder 1"/>
+          <p:cNvSpPr>
+            <a:spLocks noGrp="1" noRot="1" noChangeAspect="1"/>
+          </p:cNvSpPr>
+          <p:nvPr>
+            <p:ph type="sldImg"/>
+          </p:nvPr>
+        </p:nvSpPr>
+        <p:spPr/>
+      </p:sp>
+      <p:sp>
+        <p:nvSpPr>
+          <p:cNvPr id="3" name="Notes Placeholder 2"/>
+          <p:cNvSpPr>
+            <a:spLocks noGrp="1"/>
+          </p:cNvSpPr>
+          <p:nvPr>
+            <p:ph type="body" idx="1"/>
+          </p:nvPr>
+        </p:nvSpPr>
+        <p:spPr/>
+        <p:txBody>
+          <a:bodyPr/>
+          <a:lstStyle/>
+          <a:p>
             <a:endParaRPr lang="en-IE" baseline="0" dirty="0" smtClean="0"/>
           </a:p>
         </p:txBody>
@@ -620,6 +793,90 @@
             <a:fld id="{ABE5CB41-8F34-4FAE-BDD8-10A032863583}" type="slidenum">
               <a:rPr lang="en-IE" smtClean="0"/>
               <a:t>11</a:t>
+            </a:fld>
+            <a:endParaRPr lang="en-IE"/>
+          </a:p>
+        </p:txBody>
+      </p:sp>
+    </p:spTree>
+    <p:extLst>
+      <p:ext uri="{BB962C8B-B14F-4D97-AF65-F5344CB8AC3E}">
+        <p14:creationId xmlns:p14="http://schemas.microsoft.com/office/powerpoint/2010/main" val="2154761357"/>
+      </p:ext>
+    </p:extLst>
+  </p:cSld>
+  <p:clrMapOvr>
+    <a:masterClrMapping/>
+  </p:clrMapOvr>
+</p:notes>
+</file>
+
+<file path=ppt/notesSlides/notesSlide12.xml><?xml version="1.0" encoding="utf-8"?>
+<p:notes xmlns:a="http://schemas.openxmlformats.org/drawingml/2006/main" xmlns:r="http://schemas.openxmlformats.org/officeDocument/2006/relationships" xmlns:p="http://schemas.openxmlformats.org/presentationml/2006/main">
+  <p:cSld>
+    <p:spTree>
+      <p:nvGrpSpPr>
+        <p:cNvPr id="1" name=""/>
+        <p:cNvGrpSpPr/>
+        <p:nvPr/>
+      </p:nvGrpSpPr>
+      <p:grpSpPr>
+        <a:xfrm>
+          <a:off x="0" y="0"/>
+          <a:ext cx="0" cy="0"/>
+          <a:chOff x="0" y="0"/>
+          <a:chExt cx="0" cy="0"/>
+        </a:xfrm>
+      </p:grpSpPr>
+      <p:sp>
+        <p:nvSpPr>
+          <p:cNvPr id="2" name="Slide Image Placeholder 1"/>
+          <p:cNvSpPr>
+            <a:spLocks noGrp="1" noRot="1" noChangeAspect="1"/>
+          </p:cNvSpPr>
+          <p:nvPr>
+            <p:ph type="sldImg"/>
+          </p:nvPr>
+        </p:nvSpPr>
+        <p:spPr/>
+      </p:sp>
+      <p:sp>
+        <p:nvSpPr>
+          <p:cNvPr id="3" name="Notes Placeholder 2"/>
+          <p:cNvSpPr>
+            <a:spLocks noGrp="1"/>
+          </p:cNvSpPr>
+          <p:nvPr>
+            <p:ph type="body" idx="1"/>
+          </p:nvPr>
+        </p:nvSpPr>
+        <p:spPr/>
+        <p:txBody>
+          <a:bodyPr/>
+          <a:lstStyle/>
+          <a:p>
+            <a:endParaRPr lang="en-IE" baseline="0" dirty="0" smtClean="0"/>
+          </a:p>
+        </p:txBody>
+      </p:sp>
+      <p:sp>
+        <p:nvSpPr>
+          <p:cNvPr id="4" name="Slide Number Placeholder 3"/>
+          <p:cNvSpPr>
+            <a:spLocks noGrp="1"/>
+          </p:cNvSpPr>
+          <p:nvPr>
+            <p:ph type="sldNum" sz="quarter" idx="10"/>
+          </p:nvPr>
+        </p:nvSpPr>
+        <p:spPr/>
+        <p:txBody>
+          <a:bodyPr/>
+          <a:lstStyle/>
+          <a:p>
+            <a:fld id="{ABE5CB41-8F34-4FAE-BDD8-10A032863583}" type="slidenum">
+              <a:rPr lang="en-IE" smtClean="0"/>
+              <a:t>12</a:t>
             </a:fld>
             <a:endParaRPr lang="en-IE"/>
           </a:p>
@@ -682,51 +939,6 @@
           <a:bodyPr/>
           <a:lstStyle/>
           <a:p>
-            <a:r>
-              <a:rPr lang="en-IE" dirty="0" smtClean="0"/>
-              <a:t>Mentors should check that all laptops are up and running, are</a:t>
-            </a:r>
-            <a:r>
-              <a:rPr lang="en-IE" baseline="0" dirty="0" smtClean="0"/>
-              <a:t> on the wireless network, can see the internet (google.ie, youtube.com, https://thimble.webmaker.org, dojo.hallamor.org)</a:t>
-            </a:r>
-          </a:p>
-          <a:p>
-            <a:endParaRPr lang="en-IE" baseline="0" dirty="0" smtClean="0"/>
-          </a:p>
-          <a:p>
-            <a:r>
-              <a:rPr lang="en-IE" baseline="0" dirty="0" smtClean="0"/>
-              <a:t>We would also like to have a decent editor (komodo edit is good: is saves on errors) and ideally Chrome as the browser installed.</a:t>
-            </a:r>
-          </a:p>
-          <a:p>
-            <a:endParaRPr lang="en-IE" baseline="0" dirty="0" smtClean="0"/>
-          </a:p>
-          <a:p>
-            <a:r>
-              <a:rPr lang="en-IE" baseline="0" dirty="0" smtClean="0"/>
-              <a:t>Having the same browser everywhere makes it much easier for mentors to help out in later sessions.</a:t>
-            </a:r>
-          </a:p>
-          <a:p>
-            <a:r>
-              <a:rPr lang="en-IE" baseline="0" dirty="0" smtClean="0"/>
-              <a:t>So now we need to go around and make sure everyone is setup.</a:t>
-            </a:r>
-          </a:p>
-          <a:p>
-            <a:endParaRPr lang="en-IE" baseline="0" dirty="0" smtClean="0"/>
-          </a:p>
-          <a:p>
-            <a:r>
-              <a:rPr lang="en-IE" baseline="0" dirty="0" smtClean="0"/>
-              <a:t>USB keys should have </a:t>
-            </a:r>
-            <a:r>
-              <a:rPr lang="en-IE" baseline="0" smtClean="0"/>
-              <a:t>the installs for our tools.</a:t>
-            </a:r>
             <a:endParaRPr lang="en-IE" dirty="0"/>
           </a:p>
         </p:txBody>
@@ -748,7 +960,7 @@
           <a:p>
             <a:fld id="{ABE5CB41-8F34-4FAE-BDD8-10A032863583}" type="slidenum">
               <a:rPr lang="en-IE" smtClean="0"/>
-              <a:t>3</a:t>
+              <a:t>2</a:t>
             </a:fld>
             <a:endParaRPr lang="en-IE"/>
           </a:p>
@@ -757,7 +969,7 @@
     </p:spTree>
     <p:extLst>
       <p:ext uri="{BB962C8B-B14F-4D97-AF65-F5344CB8AC3E}">
-        <p14:creationId xmlns:p14="http://schemas.microsoft.com/office/powerpoint/2010/main" val="45962937"/>
+        <p14:creationId xmlns:p14="http://schemas.microsoft.com/office/powerpoint/2010/main" val="564335125"/>
       </p:ext>
     </p:extLst>
   </p:cSld>
@@ -811,173 +1023,6 @@
           <a:bodyPr/>
           <a:lstStyle/>
           <a:p>
-            <a:r>
-              <a:rPr lang="en-IE" dirty="0" smtClean="0"/>
-              <a:t>HTML is Hyper</a:t>
-            </a:r>
-            <a:r>
-              <a:rPr lang="en-IE" baseline="0" dirty="0" smtClean="0"/>
-              <a:t> Text </a:t>
-            </a:r>
-            <a:r>
-              <a:rPr lang="en-IE" baseline="0" dirty="0" err="1" smtClean="0"/>
-              <a:t>Markup</a:t>
-            </a:r>
-            <a:r>
-              <a:rPr lang="en-IE" baseline="0" dirty="0" smtClean="0"/>
-              <a:t> Language: it is not a programming language, it is a “</a:t>
-            </a:r>
-            <a:r>
-              <a:rPr lang="en-IE" baseline="0" dirty="0" err="1" smtClean="0"/>
-              <a:t>markup</a:t>
-            </a:r>
-            <a:r>
-              <a:rPr lang="en-IE" baseline="0" dirty="0" smtClean="0"/>
-              <a:t>”: it describes what the web browser should do with the text in your document.</a:t>
-            </a:r>
-          </a:p>
-          <a:p>
-            <a:endParaRPr lang="en-IE" dirty="0" smtClean="0"/>
-          </a:p>
-          <a:p>
-            <a:r>
-              <a:rPr lang="en-IE" dirty="0" smtClean="0"/>
-              <a:t>HTML tags</a:t>
-            </a:r>
-          </a:p>
-          <a:p>
-            <a:r>
-              <a:rPr lang="en-IE" dirty="0" smtClean="0"/>
-              <a:t>(almost)</a:t>
-            </a:r>
-            <a:r>
-              <a:rPr lang="en-IE" baseline="0" dirty="0" smtClean="0"/>
-              <a:t> all tags have a &lt;tag&gt; and &lt;/tag&gt; closure</a:t>
-            </a:r>
-          </a:p>
-          <a:p>
-            <a:endParaRPr lang="en-IE" baseline="0" dirty="0" smtClean="0"/>
-          </a:p>
-          <a:p>
-            <a:r>
-              <a:rPr lang="en-IE" baseline="0" dirty="0" smtClean="0"/>
-              <a:t>Kids should:</a:t>
-            </a:r>
-          </a:p>
-          <a:p>
-            <a:pPr marL="171450" indent="-171450">
-              <a:buFont typeface="Arial" charset="0"/>
-              <a:buChar char="•"/>
-            </a:pPr>
-            <a:r>
-              <a:rPr lang="en-IE" baseline="0" dirty="0" smtClean="0"/>
-              <a:t>Create a directory on their computer for their work and save the file there</a:t>
-            </a:r>
-          </a:p>
-          <a:p>
-            <a:pPr marL="171450" marR="0" indent="-171450" algn="l" defTabSz="914400" rtl="0" eaLnBrk="1" fontAlgn="auto" latinLnBrk="0" hangingPunct="1">
-              <a:lnSpc>
-                <a:spcPct val="100000"/>
-              </a:lnSpc>
-              <a:spcBef>
-                <a:spcPts val="0"/>
-              </a:spcBef>
-              <a:spcAft>
-                <a:spcPts val="0"/>
-              </a:spcAft>
-              <a:buClrTx/>
-              <a:buSzTx/>
-              <a:buFont typeface="Arial" charset="0"/>
-              <a:buChar char="•"/>
-              <a:tabLst/>
-              <a:defRPr/>
-            </a:pPr>
-            <a:r>
-              <a:rPr lang="en-IE" baseline="0" dirty="0" smtClean="0"/>
-              <a:t>Create a file with the name of their site</a:t>
-            </a:r>
-          </a:p>
-          <a:p>
-            <a:pPr marL="171450" indent="-171450">
-              <a:buFont typeface="Arial" charset="0"/>
-              <a:buChar char="•"/>
-            </a:pPr>
-            <a:r>
-              <a:rPr lang="en-IE" baseline="0" dirty="0" smtClean="0"/>
-              <a:t>NB they MUST save to .html </a:t>
-            </a:r>
-            <a:r>
-              <a:rPr lang="en-IE" baseline="0" dirty="0" err="1" smtClean="0"/>
-              <a:t>filetype</a:t>
-            </a:r>
-            <a:r>
-              <a:rPr lang="en-IE" baseline="0" dirty="0" smtClean="0"/>
-              <a:t>, or else the browser won’t open it</a:t>
-            </a:r>
-          </a:p>
-          <a:p>
-            <a:pPr marL="171450" indent="-171450">
-              <a:buFont typeface="Arial" charset="0"/>
-              <a:buChar char="•"/>
-            </a:pPr>
-            <a:r>
-              <a:rPr lang="en-IE" baseline="0" dirty="0" smtClean="0"/>
-              <a:t>Also NB: the *kids* do the typing, *NOT* the parents</a:t>
-            </a:r>
-          </a:p>
-          <a:p>
-            <a:pPr marL="171450" indent="-171450">
-              <a:buFont typeface="Arial" charset="0"/>
-              <a:buChar char="•"/>
-            </a:pPr>
-            <a:r>
-              <a:rPr lang="en-IE" baseline="0" dirty="0" smtClean="0"/>
-              <a:t>Then they need to find this file and open it up in their browser</a:t>
-            </a:r>
-          </a:p>
-          <a:p>
-            <a:pPr marL="171450" indent="-171450">
-              <a:buFont typeface="Arial" charset="0"/>
-              <a:buChar char="•"/>
-            </a:pPr>
-            <a:r>
-              <a:rPr lang="en-IE" baseline="0" dirty="0" smtClean="0"/>
-              <a:t>They should see the title in the title bar, and “It’s me!”, and nothing else</a:t>
-            </a:r>
-          </a:p>
-          <a:p>
-            <a:pPr marL="171450" indent="-171450">
-              <a:buFont typeface="Arial" charset="0"/>
-              <a:buChar char="•"/>
-            </a:pPr>
-            <a:endParaRPr lang="en-IE" baseline="0" dirty="0" smtClean="0"/>
-          </a:p>
-          <a:p>
-            <a:pPr marL="171450" indent="-171450">
-              <a:buFont typeface="Arial" charset="0"/>
-              <a:buChar char="•"/>
-            </a:pPr>
-            <a:r>
-              <a:rPr lang="en-IE" baseline="0" dirty="0" smtClean="0"/>
-              <a:t>Then we demonstrate changing this file and reloading in the browser: important for later</a:t>
-            </a:r>
-          </a:p>
-          <a:p>
-            <a:pPr marL="171450" indent="-171450">
-              <a:buFont typeface="Arial" charset="0"/>
-              <a:buChar char="•"/>
-            </a:pPr>
-            <a:endParaRPr lang="en-IE" baseline="0" dirty="0" smtClean="0"/>
-          </a:p>
-          <a:p>
-            <a:pPr marL="171450" indent="-171450">
-              <a:buFont typeface="Arial" charset="0"/>
-              <a:buChar char="•"/>
-            </a:pPr>
-            <a:r>
-              <a:rPr lang="en-IE" baseline="0" dirty="0" smtClean="0"/>
-              <a:t>We move on when most of them have reached this stage</a:t>
-            </a:r>
             <a:endParaRPr lang="en-IE" dirty="0"/>
           </a:p>
         </p:txBody>
@@ -999,7 +1044,7 @@
           <a:p>
             <a:fld id="{ABE5CB41-8F34-4FAE-BDD8-10A032863583}" type="slidenum">
               <a:rPr lang="en-IE" smtClean="0"/>
-              <a:t>4</a:t>
+              <a:t>3</a:t>
             </a:fld>
             <a:endParaRPr lang="en-IE"/>
           </a:p>
@@ -1008,7 +1053,7 @@
     </p:spTree>
     <p:extLst>
       <p:ext uri="{BB962C8B-B14F-4D97-AF65-F5344CB8AC3E}">
-        <p14:creationId xmlns:p14="http://schemas.microsoft.com/office/powerpoint/2010/main" val="2154761357"/>
+        <p14:creationId xmlns:p14="http://schemas.microsoft.com/office/powerpoint/2010/main" val="2067379537"/>
       </p:ext>
     </p:extLst>
   </p:cSld>
@@ -1057,74 +1102,74 @@
             <p:ph type="body" idx="1"/>
           </p:nvPr>
         </p:nvSpPr>
-        <p:spPr/>
+        <p:spPr>
+          <a:xfrm>
+            <a:off x="685800" y="4343400"/>
+            <a:ext cx="5486400" cy="3540968"/>
+          </a:xfrm>
+        </p:spPr>
         <p:txBody>
           <a:bodyPr/>
           <a:lstStyle/>
           <a:p>
             <a:r>
               <a:rPr lang="en-IE" dirty="0" smtClean="0"/>
-              <a:t>HTML tags</a:t>
-            </a:r>
-          </a:p>
-          <a:p>
-            <a:r>
-              <a:rPr lang="en-IE" dirty="0" smtClean="0"/>
-              <a:t>&lt;</a:t>
+              <a:t>Mentors should check that all laptops are up and running, are</a:t>
+            </a:r>
+            <a:r>
+              <a:rPr lang="en-IE" baseline="0" dirty="0" smtClean="0"/>
+              <a:t> on the wireless network, can see the internet (google.ie, </a:t>
+            </a:r>
+            <a:r>
+              <a:rPr lang="en-IE" baseline="0" dirty="0" smtClean="0"/>
+              <a:t>maps.google.com https</a:t>
+            </a:r>
+            <a:r>
+              <a:rPr lang="en-IE" baseline="0" dirty="0" smtClean="0"/>
+              <a:t>://thimble.webmaker.org, dojo.hallamor.org)</a:t>
+            </a:r>
+          </a:p>
+          <a:p>
+            <a:endParaRPr lang="en-IE" baseline="0" dirty="0" smtClean="0"/>
+          </a:p>
+          <a:p>
+            <a:r>
+              <a:rPr lang="en-IE" dirty="0" smtClean="0"/>
+              <a:t>On a school network (like </a:t>
             </a:r>
             <a:r>
               <a:rPr lang="en-IE" dirty="0" err="1" smtClean="0"/>
-              <a:t>hx</a:t>
-            </a:r>
-            <a:r>
-              <a:rPr lang="en-IE" dirty="0" smtClean="0"/>
-              <a:t>&gt; tags, where</a:t>
-            </a:r>
-            <a:r>
-              <a:rPr lang="en-IE" baseline="0" dirty="0" smtClean="0"/>
-              <a:t> x is 1, 2, 3 .. </a:t>
-            </a:r>
-            <a:r>
-              <a:rPr lang="en-IE" baseline="0" dirty="0" err="1" smtClean="0"/>
-              <a:t>Etc</a:t>
-            </a:r>
+              <a:t>Pres</a:t>
+            </a:r>
+            <a:r>
+              <a:rPr lang="en-IE" dirty="0" smtClean="0"/>
+              <a:t> Bray) various sites are blocked. </a:t>
+            </a:r>
+            <a:r>
+              <a:rPr lang="en-IE" dirty="0" err="1" smtClean="0"/>
+              <a:t>Youtube</a:t>
+            </a:r>
+            <a:r>
+              <a:rPr lang="en-IE" dirty="0" smtClean="0"/>
+              <a:t> for example does not work)</a:t>
+            </a:r>
+          </a:p>
+          <a:p>
             <a:endParaRPr lang="en-IE" baseline="0" dirty="0" smtClean="0"/>
           </a:p>
           <a:p>
+            <a:r>
+              <a:rPr lang="en-IE" baseline="0" dirty="0" smtClean="0"/>
+              <a:t>We would also like to have a decent editor (komodo edit is good: is saves on errors) and ideally Chrome as the browser installed.</a:t>
+            </a:r>
+          </a:p>
+          <a:p>
             <a:endParaRPr lang="en-IE" baseline="0" dirty="0" smtClean="0"/>
           </a:p>
           <a:p>
             <a:r>
               <a:rPr lang="en-IE" baseline="0" dirty="0" smtClean="0"/>
-              <a:t>&lt;</a:t>
-            </a:r>
-            <a:r>
-              <a:rPr lang="en-IE" baseline="0" dirty="0" err="1" smtClean="0"/>
-              <a:t>img</a:t>
-            </a:r>
-            <a:r>
-              <a:rPr lang="en-IE" baseline="0" dirty="0" smtClean="0"/>
-              <a:t> </a:t>
-            </a:r>
-            <a:r>
-              <a:rPr lang="en-IE" baseline="0" dirty="0" err="1" smtClean="0"/>
-              <a:t>src</a:t>
-            </a:r>
-            <a:r>
-              <a:rPr lang="en-IE" baseline="0" dirty="0" smtClean="0"/>
-              <a:t>=“”&gt; tags: explain what a URL is</a:t>
-            </a:r>
-          </a:p>
-          <a:p>
-            <a:r>
-              <a:rPr lang="en-IE" baseline="0" dirty="0" smtClean="0"/>
-              <a:t>And how to get one from the browser bar in the web browser</a:t>
-            </a:r>
-          </a:p>
-          <a:p>
-            <a:r>
-              <a:rPr lang="en-IE" baseline="0" dirty="0" smtClean="0"/>
-              <a:t>Copy/Paste into the code</a:t>
+              <a:t>Having the same browser everywhere makes it much easier for mentors to help out in later sessions.</a:t>
             </a:r>
           </a:p>
           <a:p>
@@ -1133,23 +1178,11 @@
           <a:p>
             <a:r>
               <a:rPr lang="en-IE" baseline="0" dirty="0" smtClean="0"/>
-              <a:t>Some sample pictures on dojo.hallamor.org/</a:t>
-            </a:r>
-            <a:r>
-              <a:rPr lang="en-IE" baseline="0" dirty="0" err="1" smtClean="0"/>
-              <a:t>eden</a:t>
-            </a:r>
-            <a:r>
-              <a:rPr lang="en-IE" baseline="0" dirty="0" smtClean="0"/>
-              <a:t>/bray/images: session_1b uses “</a:t>
-            </a:r>
-            <a:r>
-              <a:rPr lang="en-IE" baseline="0" dirty="0" err="1" smtClean="0"/>
-              <a:t>taz</a:t>
-            </a:r>
-            <a:r>
-              <a:rPr lang="en-IE" baseline="0" dirty="0" smtClean="0"/>
-              <a:t>”</a:t>
+              <a:t>So </a:t>
+            </a:r>
+            <a:r>
+              <a:rPr lang="en-IE" baseline="0" dirty="0" smtClean="0"/>
+              <a:t>now we need to go around and make sure everyone is setup.</a:t>
             </a:r>
           </a:p>
           <a:p>
@@ -1158,67 +1191,9 @@
           <a:p>
             <a:r>
               <a:rPr lang="en-IE" baseline="0" dirty="0" smtClean="0"/>
-              <a:t>Encourage the kids to go out onto the internet, and find their own images, and make their own page</a:t>
-            </a:r>
-          </a:p>
-          <a:p>
-            <a:r>
-              <a:rPr lang="en-IE" baseline="0" dirty="0" smtClean="0"/>
-              <a:t>Omit the &lt;</a:t>
-            </a:r>
-            <a:r>
-              <a:rPr lang="en-IE" baseline="0" dirty="0" err="1" smtClean="0"/>
-              <a:t>br</a:t>
-            </a:r>
-            <a:r>
-              <a:rPr lang="en-IE" baseline="0" dirty="0" smtClean="0"/>
-              <a:t>/&gt; at first. See what the page looks like.</a:t>
-            </a:r>
-          </a:p>
-          <a:p>
-            <a:r>
-              <a:rPr lang="en-IE" baseline="0" dirty="0" smtClean="0"/>
-              <a:t>Then put it in: why is it different? HTML ignores whitespace, </a:t>
-            </a:r>
-            <a:r>
-              <a:rPr lang="en-IE" baseline="0" dirty="0" err="1" smtClean="0"/>
-              <a:t>linebreaks</a:t>
-            </a:r>
-            <a:r>
-              <a:rPr lang="en-IE" baseline="0" dirty="0" smtClean="0"/>
-              <a:t> …</a:t>
-            </a:r>
-          </a:p>
-          <a:p>
-            <a:endParaRPr lang="en-IE" baseline="0" dirty="0" smtClean="0"/>
-          </a:p>
-          <a:p>
-            <a:pPr marL="0" indent="0">
-              <a:buFont typeface="Arial" charset="0"/>
-              <a:buNone/>
-            </a:pPr>
-            <a:r>
-              <a:rPr lang="en-IE" baseline="0" dirty="0" smtClean="0"/>
-              <a:t>Same for &lt;a </a:t>
-            </a:r>
-            <a:r>
-              <a:rPr lang="en-IE" baseline="0" dirty="0" err="1" smtClean="0"/>
-              <a:t>href</a:t>
-            </a:r>
-            <a:r>
-              <a:rPr lang="en-IE" baseline="0" dirty="0" smtClean="0"/>
-              <a:t>=“”&gt;… &lt;/a&gt;</a:t>
-            </a:r>
-          </a:p>
-          <a:p>
-            <a:pPr marL="0" indent="0">
-              <a:buFont typeface="Arial" charset="0"/>
-              <a:buNone/>
-            </a:pPr>
-            <a:r>
-              <a:rPr lang="en-IE" baseline="0" dirty="0" smtClean="0"/>
-              <a:t>Whatever is between the tags becomes the reference. It can be text, or a picture</a:t>
-            </a:r>
+              <a:t>USB keys should have the installs for our tools, although sometimes these have been seen not to work and a download from the internet was required.</a:t>
+            </a:r>
+            <a:endParaRPr lang="en-IE" dirty="0"/>
           </a:p>
         </p:txBody>
       </p:sp>
@@ -1239,7 +1214,7 @@
           <a:p>
             <a:fld id="{ABE5CB41-8F34-4FAE-BDD8-10A032863583}" type="slidenum">
               <a:rPr lang="en-IE" smtClean="0"/>
-              <a:t>5</a:t>
+              <a:t>4</a:t>
             </a:fld>
             <a:endParaRPr lang="en-IE"/>
           </a:p>
@@ -1248,7 +1223,7 @@
     </p:spTree>
     <p:extLst>
       <p:ext uri="{BB962C8B-B14F-4D97-AF65-F5344CB8AC3E}">
-        <p14:creationId xmlns:p14="http://schemas.microsoft.com/office/powerpoint/2010/main" val="2154761357"/>
+        <p14:creationId xmlns:p14="http://schemas.microsoft.com/office/powerpoint/2010/main" val="45962937"/>
       </p:ext>
     </p:extLst>
   </p:cSld>
@@ -1304,7 +1279,46 @@
           <a:p>
             <a:r>
               <a:rPr lang="en-IE" dirty="0" smtClean="0"/>
-              <a:t>Try the “marquee” tag</a:t>
+              <a:t>HTML is Hyper</a:t>
+            </a:r>
+            <a:r>
+              <a:rPr lang="en-IE" baseline="0" dirty="0" smtClean="0"/>
+              <a:t> Text </a:t>
+            </a:r>
+            <a:r>
+              <a:rPr lang="en-IE" baseline="0" dirty="0" err="1" smtClean="0"/>
+              <a:t>Markup</a:t>
+            </a:r>
+            <a:r>
+              <a:rPr lang="en-IE" baseline="0" dirty="0" smtClean="0"/>
+              <a:t> Language: it is not a programming language, it is a “</a:t>
+            </a:r>
+            <a:r>
+              <a:rPr lang="en-IE" baseline="0" dirty="0" err="1" smtClean="0"/>
+              <a:t>markup</a:t>
+            </a:r>
+            <a:r>
+              <a:rPr lang="en-IE" baseline="0" dirty="0" smtClean="0"/>
+              <a:t>”: it describes what the web browser should do with the text in your document.</a:t>
+            </a:r>
+          </a:p>
+          <a:p>
+            <a:endParaRPr lang="en-IE" dirty="0" smtClean="0"/>
+          </a:p>
+          <a:p>
+            <a:r>
+              <a:rPr lang="en-IE" dirty="0" smtClean="0"/>
+              <a:t>HTML tags</a:t>
+            </a:r>
+          </a:p>
+          <a:p>
+            <a:r>
+              <a:rPr lang="en-IE" dirty="0" smtClean="0"/>
+              <a:t>(almost)</a:t>
+            </a:r>
+            <a:r>
+              <a:rPr lang="en-IE" baseline="0" dirty="0" smtClean="0"/>
+              <a:t> all tags have a &lt;tag&gt; and &lt;/tag&gt; closure</a:t>
             </a:r>
           </a:p>
           <a:p>
@@ -1313,87 +1327,124 @@
           <a:p>
             <a:r>
               <a:rPr lang="en-IE" baseline="0" dirty="0" smtClean="0"/>
-              <a:t>It is not entirely “kosher” HTML, but it works fine</a:t>
-            </a:r>
-          </a:p>
-          <a:p>
+              <a:t>Kids should:</a:t>
+            </a:r>
+          </a:p>
+          <a:p>
+            <a:pPr marL="171450" indent="-171450">
+              <a:buFont typeface="Arial" charset="0"/>
+              <a:buChar char="•"/>
+            </a:pPr>
+            <a:r>
+              <a:rPr lang="en-IE" baseline="0" dirty="0" smtClean="0"/>
+              <a:t>Create a directory on their computer for their work and save the file there</a:t>
+            </a:r>
+          </a:p>
+          <a:p>
+            <a:pPr marL="171450" marR="0" indent="-171450" algn="l" defTabSz="914400" rtl="0" eaLnBrk="1" fontAlgn="auto" latinLnBrk="0" hangingPunct="1">
+              <a:lnSpc>
+                <a:spcPct val="100000"/>
+              </a:lnSpc>
+              <a:spcBef>
+                <a:spcPts val="0"/>
+              </a:spcBef>
+              <a:spcAft>
+                <a:spcPts val="0"/>
+              </a:spcAft>
+              <a:buClrTx/>
+              <a:buSzTx/>
+              <a:buFont typeface="Arial" charset="0"/>
+              <a:buChar char="•"/>
+              <a:tabLst/>
+              <a:defRPr/>
+            </a:pPr>
+            <a:r>
+              <a:rPr lang="en-IE" baseline="0" dirty="0" smtClean="0"/>
+              <a:t>Create a file with the name of their site</a:t>
+            </a:r>
+          </a:p>
+          <a:p>
+            <a:pPr marL="171450" indent="-171450">
+              <a:buFont typeface="Arial" charset="0"/>
+              <a:buChar char="•"/>
+            </a:pPr>
+            <a:r>
+              <a:rPr lang="en-IE" baseline="0" dirty="0" smtClean="0"/>
+              <a:t>NB they MUST save to .html </a:t>
+            </a:r>
+            <a:r>
+              <a:rPr lang="en-IE" baseline="0" dirty="0" err="1" smtClean="0"/>
+              <a:t>filetype</a:t>
+            </a:r>
+            <a:r>
+              <a:rPr lang="en-IE" baseline="0" dirty="0" smtClean="0"/>
+              <a:t>, or else the browser won’t open it</a:t>
+            </a:r>
+          </a:p>
+          <a:p>
+            <a:pPr marL="171450" indent="-171450">
+              <a:buFont typeface="Arial" charset="0"/>
+              <a:buChar char="•"/>
+            </a:pPr>
+            <a:r>
+              <a:rPr lang="en-IE" baseline="0" dirty="0" smtClean="0"/>
+              <a:t>Also NB: the *kids* do the typing, *NOT* the parents</a:t>
+            </a:r>
+          </a:p>
+          <a:p>
+            <a:pPr marL="171450" indent="-171450">
+              <a:buFont typeface="Arial" charset="0"/>
+              <a:buChar char="•"/>
+            </a:pPr>
+            <a:r>
+              <a:rPr lang="en-IE" baseline="0" dirty="0" smtClean="0"/>
+              <a:t>Then they need to find this file and open it up in their browser</a:t>
+            </a:r>
+          </a:p>
+          <a:p>
+            <a:pPr marL="171450" indent="-171450">
+              <a:buFont typeface="Arial" charset="0"/>
+              <a:buChar char="•"/>
+            </a:pPr>
+            <a:r>
+              <a:rPr lang="en-IE" baseline="0" dirty="0" smtClean="0"/>
+              <a:t>They should see the title in the title bar, and “It’s me!”, and nothing else</a:t>
+            </a:r>
+          </a:p>
+          <a:p>
+            <a:pPr marL="171450" indent="-171450">
+              <a:buFont typeface="Arial" charset="0"/>
+              <a:buChar char="•"/>
+            </a:pPr>
             <a:endParaRPr lang="en-IE" baseline="0" dirty="0" smtClean="0"/>
           </a:p>
           <a:p>
-            <a:r>
-              <a:rPr lang="en-IE" baseline="0" dirty="0" smtClean="0"/>
-              <a:t>&lt;marquee direction = “X” </a:t>
-            </a:r>
-            <a:r>
-              <a:rPr lang="en-IE" baseline="0" dirty="0" err="1" smtClean="0"/>
-              <a:t>scrollamount</a:t>
-            </a:r>
-            <a:r>
-              <a:rPr lang="en-IE" baseline="0" dirty="0" smtClean="0"/>
-              <a:t>=Y </a:t>
-            </a:r>
-            <a:r>
-              <a:rPr lang="en-IE" baseline="0" dirty="0" err="1" smtClean="0"/>
-              <a:t>bgcolor</a:t>
-            </a:r>
-            <a:r>
-              <a:rPr lang="en-IE" baseline="0" dirty="0" smtClean="0"/>
-              <a:t>=Z&gt; text to scroll&lt;/marquee&gt;</a:t>
-            </a:r>
-          </a:p>
-          <a:p>
+            <a:pPr marL="171450" indent="-171450">
+              <a:buFont typeface="Arial" charset="0"/>
+              <a:buChar char="•"/>
+            </a:pPr>
+            <a:r>
+              <a:rPr lang="en-IE" baseline="0" dirty="0" smtClean="0"/>
+              <a:t>Then we demonstrate changing this file and reloading in the browser: important for later</a:t>
+            </a:r>
+          </a:p>
+          <a:p>
+            <a:pPr marL="171450" indent="-171450">
+              <a:buFont typeface="Arial" charset="0"/>
+              <a:buChar char="•"/>
+            </a:pPr>
             <a:endParaRPr lang="en-IE" baseline="0" dirty="0" smtClean="0"/>
           </a:p>
           <a:p>
-            <a:r>
-              <a:rPr lang="en-IE" baseline="0" dirty="0" smtClean="0"/>
-              <a:t>Note </a:t>
-            </a:r>
-            <a:r>
-              <a:rPr lang="en-IE" baseline="0" dirty="0" err="1" smtClean="0"/>
-              <a:t>american</a:t>
-            </a:r>
-            <a:r>
-              <a:rPr lang="en-IE" baseline="0" dirty="0" smtClean="0"/>
-              <a:t> spelling of “</a:t>
-            </a:r>
-            <a:r>
-              <a:rPr lang="en-IE" baseline="0" dirty="0" err="1" smtClean="0"/>
-              <a:t>color</a:t>
-            </a:r>
-            <a:r>
-              <a:rPr lang="en-IE" baseline="0" dirty="0" smtClean="0"/>
-              <a:t>”</a:t>
-            </a:r>
-          </a:p>
-          <a:p>
-            <a:endParaRPr lang="en-IE" baseline="0" dirty="0" smtClean="0"/>
-          </a:p>
-          <a:p>
-            <a:r>
-              <a:rPr lang="en-IE" baseline="0" dirty="0" smtClean="0"/>
-              <a:t>Ask the kids: what do you think would happen if you used an image, instead of the text between the marquee tags?</a:t>
-            </a:r>
-          </a:p>
-          <a:p>
-            <a:r>
-              <a:rPr lang="en-IE" baseline="0" dirty="0" smtClean="0"/>
-              <a:t>Get them to try this, with their own images, or with images from </a:t>
-            </a:r>
-            <a:r>
-              <a:rPr lang="en-IE" baseline="0" dirty="0" err="1" smtClean="0"/>
-              <a:t>hallamor</a:t>
-            </a:r>
-            <a:r>
-              <a:rPr lang="en-IE" baseline="0" dirty="0" smtClean="0"/>
-              <a:t>: some of the animated images look good scrolling about.</a:t>
-            </a:r>
-          </a:p>
-          <a:p>
-            <a:r>
-              <a:rPr lang="en-IE" baseline="0" dirty="0" smtClean="0"/>
-              <a:t>They should make some pages using these or other images</a:t>
-            </a:r>
+            <a:pPr marL="171450" indent="-171450">
+              <a:buFont typeface="Arial" charset="0"/>
+              <a:buChar char="•"/>
+            </a:pPr>
+            <a:r>
+              <a:rPr lang="en-IE" baseline="0" dirty="0" smtClean="0"/>
+              <a:t>We move on when most of them have reached this stage</a:t>
+            </a:r>
+            <a:endParaRPr lang="en-IE" dirty="0"/>
           </a:p>
         </p:txBody>
       </p:sp>
@@ -1414,7 +1465,7 @@
           <a:p>
             <a:fld id="{ABE5CB41-8F34-4FAE-BDD8-10A032863583}" type="slidenum">
               <a:rPr lang="en-IE" smtClean="0"/>
-              <a:t>6</a:t>
+              <a:t>5</a:t>
             </a:fld>
             <a:endParaRPr lang="en-IE"/>
           </a:p>
@@ -1478,47 +1529,177 @@
           <a:lstStyle/>
           <a:p>
             <a:r>
-              <a:rPr lang="en-IE" baseline="0" dirty="0" smtClean="0"/>
-              <a:t>Make a new page</a:t>
-            </a:r>
-          </a:p>
-          <a:p>
+              <a:rPr lang="en-IE" dirty="0" smtClean="0"/>
+              <a:t>HTML tags</a:t>
+            </a:r>
+          </a:p>
+          <a:p>
+            <a:r>
+              <a:rPr lang="en-IE" dirty="0" smtClean="0"/>
+              <a:t>&lt;</a:t>
+            </a:r>
+            <a:r>
+              <a:rPr lang="en-IE" dirty="0" err="1" smtClean="0"/>
+              <a:t>hx</a:t>
+            </a:r>
+            <a:r>
+              <a:rPr lang="en-IE" dirty="0" smtClean="0"/>
+              <a:t>&gt; tags, where</a:t>
+            </a:r>
+            <a:r>
+              <a:rPr lang="en-IE" baseline="0" dirty="0" smtClean="0"/>
+              <a:t> x is 1, 2, 3 .. </a:t>
+            </a:r>
+            <a:r>
+              <a:rPr lang="en-IE" baseline="0" dirty="0" err="1" smtClean="0"/>
+              <a:t>Etc</a:t>
+            </a:r>
             <a:endParaRPr lang="en-IE" baseline="0" dirty="0" smtClean="0"/>
           </a:p>
           <a:p>
-            <a:r>
-              <a:rPr lang="en-IE" baseline="0" dirty="0" smtClean="0"/>
-              <a:t>With the “cool dad” video</a:t>
-            </a:r>
-          </a:p>
-          <a:p>
-            <a:r>
-              <a:rPr lang="en-IE" baseline="0" dirty="0" smtClean="0"/>
-              <a:t>Embedded onto a page</a:t>
-            </a:r>
-          </a:p>
-          <a:p>
             <a:endParaRPr lang="en-IE" baseline="0" dirty="0" smtClean="0"/>
           </a:p>
           <a:p>
             <a:r>
               <a:rPr lang="en-IE" baseline="0" dirty="0" smtClean="0"/>
-              <a:t>Then get the kids to go find their own </a:t>
+              <a:t>&lt;</a:t>
             </a:r>
             <a:r>
               <a:rPr lang="en-IE" baseline="0" dirty="0" err="1" smtClean="0"/>
-              <a:t>youtube</a:t>
-            </a:r>
-            <a:r>
-              <a:rPr lang="en-IE" baseline="0" dirty="0" smtClean="0"/>
-              <a:t> vide and embed onto their own page</a:t>
+              <a:t>img</a:t>
+            </a:r>
+            <a:r>
+              <a:rPr lang="en-IE" baseline="0" dirty="0" smtClean="0"/>
+              <a:t> </a:t>
+            </a:r>
+            <a:r>
+              <a:rPr lang="en-IE" baseline="0" dirty="0" err="1" smtClean="0"/>
+              <a:t>src</a:t>
+            </a:r>
+            <a:r>
+              <a:rPr lang="en-IE" baseline="0" dirty="0" smtClean="0"/>
+              <a:t>=“”&gt; tags: explain what a URL is</a:t>
+            </a:r>
+          </a:p>
+          <a:p>
+            <a:r>
+              <a:rPr lang="en-IE" baseline="0" dirty="0" smtClean="0"/>
+              <a:t>And how to get one from the browser bar in the web browser</a:t>
+            </a:r>
+          </a:p>
+          <a:p>
+            <a:r>
+              <a:rPr lang="en-IE" baseline="0" dirty="0" smtClean="0"/>
+              <a:t>Copy/Paste into the code</a:t>
             </a:r>
           </a:p>
           <a:p>
             <a:endParaRPr lang="en-IE" baseline="0" dirty="0" smtClean="0"/>
           </a:p>
           <a:p>
+            <a:r>
+              <a:rPr lang="en-IE" baseline="0" dirty="0" smtClean="0"/>
+              <a:t>Some sample pictures on </a:t>
+            </a:r>
+            <a:r>
+              <a:rPr lang="en-IE" b="1" baseline="0" dirty="0" smtClean="0"/>
+              <a:t>dojo.hallamor.org/</a:t>
+            </a:r>
+            <a:r>
+              <a:rPr lang="en-IE" b="1" baseline="0" dirty="0" err="1" smtClean="0"/>
+              <a:t>eden</a:t>
+            </a:r>
+            <a:r>
+              <a:rPr lang="en-IE" b="1" baseline="0" dirty="0" smtClean="0"/>
+              <a:t>/bray/images</a:t>
+            </a:r>
+            <a:r>
+              <a:rPr lang="en-IE" baseline="0" dirty="0" smtClean="0"/>
+              <a:t>: session_1b uses “</a:t>
+            </a:r>
+            <a:r>
+              <a:rPr lang="en-IE" baseline="0" dirty="0" err="1" smtClean="0"/>
+              <a:t>taz</a:t>
+            </a:r>
+            <a:r>
+              <a:rPr lang="en-IE" baseline="0" dirty="0" smtClean="0"/>
+              <a:t>”</a:t>
+            </a:r>
+          </a:p>
+          <a:p>
             <a:endParaRPr lang="en-IE" baseline="0" dirty="0" smtClean="0"/>
+          </a:p>
+          <a:p>
+            <a:r>
+              <a:rPr lang="en-IE" baseline="0" dirty="0" smtClean="0"/>
+              <a:t>Encourage the kids to go out onto the internet, and find their own images, and make their own page</a:t>
+            </a:r>
+          </a:p>
+          <a:p>
+            <a:r>
+              <a:rPr lang="en-IE" baseline="0" dirty="0" smtClean="0"/>
+              <a:t>Omit the &lt;</a:t>
+            </a:r>
+            <a:r>
+              <a:rPr lang="en-IE" baseline="0" dirty="0" err="1" smtClean="0"/>
+              <a:t>br</a:t>
+            </a:r>
+            <a:r>
+              <a:rPr lang="en-IE" baseline="0" dirty="0" smtClean="0"/>
+              <a:t>/&gt; at first. See what the page looks like.</a:t>
+            </a:r>
+          </a:p>
+          <a:p>
+            <a:endParaRPr lang="en-IE" baseline="0" dirty="0" smtClean="0"/>
+          </a:p>
+          <a:p>
+            <a:r>
+              <a:rPr lang="en-IE" baseline="0" dirty="0" smtClean="0"/>
+              <a:t>Then </a:t>
+            </a:r>
+            <a:r>
+              <a:rPr lang="en-IE" baseline="0" dirty="0" smtClean="0"/>
+              <a:t>put it in: why is it different? HTML ignores whitespace, </a:t>
+            </a:r>
+            <a:r>
+              <a:rPr lang="en-IE" baseline="0" dirty="0" err="1" smtClean="0"/>
+              <a:t>linebreaks</a:t>
+            </a:r>
+            <a:r>
+              <a:rPr lang="en-IE" baseline="0" dirty="0" smtClean="0"/>
+              <a:t> …</a:t>
+            </a:r>
+          </a:p>
+          <a:p>
+            <a:endParaRPr lang="en-IE" baseline="0" dirty="0" smtClean="0"/>
+          </a:p>
+          <a:p>
+            <a:pPr marL="0" indent="0">
+              <a:buFont typeface="Arial" charset="0"/>
+              <a:buNone/>
+            </a:pPr>
+            <a:r>
+              <a:rPr lang="en-IE" baseline="0" dirty="0" smtClean="0"/>
+              <a:t>Same for &lt;a </a:t>
+            </a:r>
+            <a:r>
+              <a:rPr lang="en-IE" baseline="0" dirty="0" err="1" smtClean="0"/>
+              <a:t>href</a:t>
+            </a:r>
+            <a:r>
+              <a:rPr lang="en-IE" baseline="0" dirty="0" smtClean="0"/>
+              <a:t>=“”&gt;… &lt;/a&gt;</a:t>
+            </a:r>
+          </a:p>
+          <a:p>
+            <a:pPr marL="0" indent="0">
+              <a:buFont typeface="Arial" charset="0"/>
+              <a:buNone/>
+            </a:pPr>
+            <a:r>
+              <a:rPr lang="en-IE" baseline="0" dirty="0" smtClean="0"/>
+              <a:t>Whatever is between the tags becomes the reference. It can be text, or a picture</a:t>
+            </a:r>
           </a:p>
         </p:txBody>
       </p:sp>
@@ -1539,7 +1720,7 @@
           <a:p>
             <a:fld id="{ABE5CB41-8F34-4FAE-BDD8-10A032863583}" type="slidenum">
               <a:rPr lang="en-IE" smtClean="0"/>
-              <a:t>7</a:t>
+              <a:t>6</a:t>
             </a:fld>
             <a:endParaRPr lang="en-IE"/>
           </a:p>
@@ -1603,8 +1784,8 @@
           <a:lstStyle/>
           <a:p>
             <a:r>
-              <a:rPr lang="en-IE" baseline="0" dirty="0" smtClean="0"/>
-              <a:t>Take the “cool dad” video page</a:t>
+              <a:rPr lang="en-IE" dirty="0" smtClean="0"/>
+              <a:t>Try the “marquee” tag</a:t>
             </a:r>
           </a:p>
           <a:p>
@@ -1613,33 +1794,49 @@
           <a:p>
             <a:r>
               <a:rPr lang="en-IE" baseline="0" dirty="0" smtClean="0"/>
-              <a:t>Add a </a:t>
+              <a:t>It is not entirely “kosher” HTML, but it works fine</a:t>
+            </a:r>
+          </a:p>
+          <a:p>
+            <a:endParaRPr lang="en-IE" baseline="0" dirty="0" smtClean="0"/>
+          </a:p>
+          <a:p>
+            <a:r>
+              <a:rPr lang="en-IE" baseline="0" dirty="0" smtClean="0"/>
+              <a:t>&lt;marquee direction = “X” </a:t>
             </a:r>
             <a:r>
               <a:rPr lang="en-IE" baseline="0" dirty="0" err="1" smtClean="0"/>
-              <a:t>jupiter</a:t>
-            </a:r>
-            <a:r>
-              <a:rPr lang="en-IE" baseline="0" dirty="0" smtClean="0"/>
-              <a:t> image first as the background-image</a:t>
-            </a:r>
-          </a:p>
-          <a:p>
-            <a:r>
-              <a:rPr lang="en-IE" baseline="0" dirty="0" smtClean="0"/>
-              <a:t>Then add background-repeat: no-repeat</a:t>
-            </a:r>
-          </a:p>
-          <a:p>
-            <a:r>
-              <a:rPr lang="en-IE" baseline="0" dirty="0" smtClean="0"/>
-              <a:t>Then add background-position: top right</a:t>
-            </a:r>
-          </a:p>
-          <a:p>
-            <a:r>
-              <a:rPr lang="en-IE" baseline="0" dirty="0" smtClean="0"/>
-              <a:t>Then add background-</a:t>
+              <a:t>scrollamount</a:t>
+            </a:r>
+            <a:r>
+              <a:rPr lang="en-IE" baseline="0" dirty="0" smtClean="0"/>
+              <a:t>=Y </a:t>
+            </a:r>
+            <a:r>
+              <a:rPr lang="en-IE" baseline="0" dirty="0" err="1" smtClean="0"/>
+              <a:t>bgcolor</a:t>
+            </a:r>
+            <a:r>
+              <a:rPr lang="en-IE" baseline="0" dirty="0" smtClean="0"/>
+              <a:t>=Z&gt; text to scroll&lt;/marquee&gt;</a:t>
+            </a:r>
+          </a:p>
+          <a:p>
+            <a:endParaRPr lang="en-IE" baseline="0" dirty="0" smtClean="0"/>
+          </a:p>
+          <a:p>
+            <a:r>
+              <a:rPr lang="en-IE" baseline="0" dirty="0" smtClean="0"/>
+              <a:t>Note </a:t>
+            </a:r>
+            <a:r>
+              <a:rPr lang="en-IE" baseline="0" dirty="0" err="1" smtClean="0"/>
+              <a:t>american</a:t>
+            </a:r>
+            <a:r>
+              <a:rPr lang="en-IE" baseline="0" dirty="0" smtClean="0"/>
+              <a:t> spelling of “</a:t>
             </a:r>
             <a:r>
               <a:rPr lang="en-IE" baseline="0" dirty="0" err="1" smtClean="0"/>
@@ -1647,7 +1844,7 @@
             </a:r>
             <a:r>
               <a:rPr lang="en-IE" baseline="0" dirty="0" smtClean="0"/>
-              <a:t>: black;</a:t>
+              <a:t>”</a:t>
             </a:r>
           </a:p>
           <a:p>
@@ -1656,13 +1853,27 @@
           <a:p>
             <a:r>
               <a:rPr lang="en-IE" baseline="0" dirty="0" smtClean="0"/>
-              <a:t>Hmm. Where is the text gone? Why can’t I see it?</a:t>
-            </a:r>
-          </a:p>
-          <a:p>
-            <a:r>
-              <a:rPr lang="en-IE" baseline="0" dirty="0" smtClean="0"/>
-              <a:t>Because the text and the background are the same colour …</a:t>
+              <a:t>Ask the kids: what do you think would happen if you used an image, instead of the text between the marquee tags?</a:t>
+            </a:r>
+          </a:p>
+          <a:p>
+            <a:r>
+              <a:rPr lang="en-IE" baseline="0" dirty="0" smtClean="0"/>
+              <a:t>Get them to try this, with their own images, or with images from </a:t>
+            </a:r>
+            <a:r>
+              <a:rPr lang="en-IE" baseline="0" dirty="0" err="1" smtClean="0"/>
+              <a:t>hallamor</a:t>
+            </a:r>
+            <a:r>
+              <a:rPr lang="en-IE" baseline="0" dirty="0" smtClean="0"/>
+              <a:t>: some of the animated images look good scrolling about.</a:t>
+            </a:r>
+          </a:p>
+          <a:p>
+            <a:r>
+              <a:rPr lang="en-IE" baseline="0" dirty="0" smtClean="0"/>
+              <a:t>There is an animated .gif of a running dog, for instance.</a:t>
             </a:r>
           </a:p>
           <a:p>
@@ -1671,53 +1882,12 @@
           <a:p>
             <a:r>
               <a:rPr lang="en-IE" baseline="0" dirty="0" smtClean="0"/>
-              <a:t>Set </a:t>
-            </a:r>
-            <a:r>
-              <a:rPr lang="en-IE" baseline="0" dirty="0" err="1" smtClean="0"/>
-              <a:t>color</a:t>
-            </a:r>
-            <a:r>
-              <a:rPr lang="en-IE" baseline="0" dirty="0" smtClean="0"/>
-              <a:t>: </a:t>
-            </a:r>
-            <a:r>
-              <a:rPr lang="en-IE" baseline="0" dirty="0" err="1" smtClean="0"/>
-              <a:t>lightgray</a:t>
-            </a:r>
-            <a:r>
-              <a:rPr lang="en-IE" baseline="0" dirty="0" smtClean="0"/>
-              <a:t>; and the text is back</a:t>
-            </a:r>
-          </a:p>
-          <a:p>
-            <a:endParaRPr lang="en-IE" baseline="0" dirty="0" smtClean="0"/>
-          </a:p>
-          <a:p>
-            <a:r>
-              <a:rPr lang="en-IE" baseline="0" dirty="0" smtClean="0"/>
-              <a:t>Now: get the kids to find their own background image, background colour </a:t>
-            </a:r>
-            <a:r>
-              <a:rPr lang="en-IE" baseline="0" dirty="0" err="1" smtClean="0"/>
-              <a:t>etc</a:t>
-            </a:r>
-            <a:r>
-              <a:rPr lang="en-IE" baseline="0" dirty="0" smtClean="0"/>
-              <a:t>, and style up their own websites</a:t>
-            </a:r>
-          </a:p>
-          <a:p>
-            <a:r>
-              <a:rPr lang="en-IE" baseline="0" dirty="0" smtClean="0"/>
-              <a:t>Get them to experiment with different colours, images</a:t>
-            </a:r>
-          </a:p>
-          <a:p>
-            <a:endParaRPr lang="en-IE" baseline="0" dirty="0" smtClean="0"/>
-          </a:p>
-          <a:p>
-            <a:endParaRPr lang="en-IE" baseline="0" dirty="0" smtClean="0"/>
+              <a:t>They </a:t>
+            </a:r>
+            <a:r>
+              <a:rPr lang="en-IE" baseline="0" dirty="0" smtClean="0"/>
+              <a:t>should make some pages using these or other images</a:t>
+            </a:r>
           </a:p>
         </p:txBody>
       </p:sp>
@@ -1738,7 +1908,7 @@
           <a:p>
             <a:fld id="{ABE5CB41-8F34-4FAE-BDD8-10A032863583}" type="slidenum">
               <a:rPr lang="en-IE" smtClean="0"/>
-              <a:t>8</a:t>
+              <a:t>7</a:t>
             </a:fld>
             <a:endParaRPr lang="en-IE"/>
           </a:p>
@@ -1803,7 +1973,7 @@
           <a:p>
             <a:r>
               <a:rPr lang="en-IE" baseline="0" dirty="0" smtClean="0"/>
-              <a:t>The easiest way to publish is to use Mozilla Thimble: this gives them a URL they can share with their granny.</a:t>
+              <a:t>Make a new page</a:t>
             </a:r>
           </a:p>
           <a:p>
@@ -1812,15 +1982,7 @@
           <a:p>
             <a:r>
               <a:rPr lang="en-IE" baseline="0" dirty="0" smtClean="0"/>
-              <a:t>This will work fine, if the </a:t>
-            </a:r>
-            <a:r>
-              <a:rPr lang="en-IE" baseline="0" dirty="0" err="1" smtClean="0"/>
-              <a:t>WiFi</a:t>
-            </a:r>
-            <a:r>
-              <a:rPr lang="en-IE" baseline="0" dirty="0" smtClean="0"/>
-              <a:t> holds up in the place we’re using</a:t>
+              <a:t>Go to a location, for example the seafront in Bray</a:t>
             </a:r>
           </a:p>
           <a:p>
@@ -1829,7 +1991,7 @@
           <a:p>
             <a:r>
               <a:rPr lang="en-IE" baseline="0" dirty="0" smtClean="0"/>
-              <a:t>There is an issue that Thimble throttles site creation from the same IP address: and it’s virtually certain that in the school we will be behind their school NAT and so appear to be from a single IP address … so they will have to retry.</a:t>
+              <a:t>Embedded onto a page</a:t>
             </a:r>
           </a:p>
           <a:p>
@@ -1838,14 +2000,42 @@
           <a:p>
             <a:r>
               <a:rPr lang="en-IE" baseline="0" dirty="0" smtClean="0"/>
-              <a:t>Thimble also does not work well with some versions of IE which have some security settings turned on.</a:t>
-            </a:r>
-          </a:p>
-          <a:p>
-            <a:r>
-              <a:rPr lang="en-IE" baseline="0" dirty="0" smtClean="0"/>
-              <a:t>For this and other reasons it would be best if everyone used Chrome as their browser.</a:t>
-            </a:r>
+              <a:t>Then get the kids to go find their own </a:t>
+            </a:r>
+            <a:r>
+              <a:rPr lang="en-IE" baseline="0" dirty="0" smtClean="0"/>
+              <a:t>maps location and </a:t>
+            </a:r>
+            <a:r>
+              <a:rPr lang="en-IE" baseline="0" dirty="0" smtClean="0"/>
+              <a:t>embed onto their own </a:t>
+            </a:r>
+            <a:r>
+              <a:rPr lang="en-IE" baseline="0" dirty="0" smtClean="0"/>
+              <a:t>page</a:t>
+            </a:r>
+          </a:p>
+          <a:p>
+            <a:endParaRPr lang="en-IE" baseline="0" dirty="0" smtClean="0"/>
+          </a:p>
+          <a:p>
+            <a:r>
+              <a:rPr lang="en-IE" baseline="0" dirty="0" smtClean="0"/>
+              <a:t>Exactly the same approach works for YouTube videos, however you can’t do this inside the school network.</a:t>
+            </a:r>
+          </a:p>
+          <a:p>
+            <a:r>
+              <a:rPr lang="en-IE" baseline="0" dirty="0" smtClean="0"/>
+              <a:t>But you ~can~ do it at home … </a:t>
+            </a:r>
+            <a:endParaRPr lang="en-IE" baseline="0" dirty="0" smtClean="0"/>
+          </a:p>
+          <a:p>
+            <a:endParaRPr lang="en-IE" baseline="0" dirty="0" smtClean="0"/>
+          </a:p>
+          <a:p>
+            <a:endParaRPr lang="en-IE" baseline="0" dirty="0" smtClean="0"/>
           </a:p>
         </p:txBody>
       </p:sp>
@@ -1866,7 +2056,7 @@
           <a:p>
             <a:fld id="{ABE5CB41-8F34-4FAE-BDD8-10A032863583}" type="slidenum">
               <a:rPr lang="en-IE" smtClean="0"/>
-              <a:t>9</a:t>
+              <a:t>8</a:t>
             </a:fld>
             <a:endParaRPr lang="en-IE"/>
           </a:p>
@@ -1929,6 +2119,139 @@
           <a:bodyPr/>
           <a:lstStyle/>
           <a:p>
+            <a:r>
+              <a:rPr lang="en-IE" baseline="0" dirty="0" smtClean="0"/>
+              <a:t>Take the </a:t>
+            </a:r>
+            <a:r>
+              <a:rPr lang="en-IE" baseline="0" dirty="0" smtClean="0"/>
+              <a:t>“seafront” page</a:t>
+            </a:r>
+            <a:endParaRPr lang="en-IE" baseline="0" dirty="0" smtClean="0"/>
+          </a:p>
+          <a:p>
+            <a:endParaRPr lang="en-IE" baseline="0" dirty="0" smtClean="0"/>
+          </a:p>
+          <a:p>
+            <a:r>
+              <a:rPr lang="en-IE" baseline="0" dirty="0" smtClean="0"/>
+              <a:t>Add a </a:t>
+            </a:r>
+            <a:r>
+              <a:rPr lang="en-IE" baseline="0" dirty="0" err="1" smtClean="0"/>
+              <a:t>jupiter</a:t>
+            </a:r>
+            <a:r>
+              <a:rPr lang="en-IE" baseline="0" dirty="0" smtClean="0"/>
+              <a:t> image first as the background-image</a:t>
+            </a:r>
+          </a:p>
+          <a:p>
+            <a:r>
+              <a:rPr lang="en-IE" baseline="0" dirty="0" smtClean="0"/>
+              <a:t>Then add background-repeat: no-repeat</a:t>
+            </a:r>
+          </a:p>
+          <a:p>
+            <a:r>
+              <a:rPr lang="en-IE" baseline="0" dirty="0" smtClean="0"/>
+              <a:t>Then add background-position: top right</a:t>
+            </a:r>
+          </a:p>
+          <a:p>
+            <a:r>
+              <a:rPr lang="en-IE" baseline="0" dirty="0" smtClean="0"/>
+              <a:t>Then add background-</a:t>
+            </a:r>
+            <a:r>
+              <a:rPr lang="en-IE" baseline="0" dirty="0" err="1" smtClean="0"/>
+              <a:t>color</a:t>
+            </a:r>
+            <a:r>
+              <a:rPr lang="en-IE" baseline="0" dirty="0" smtClean="0"/>
+              <a:t>: black;</a:t>
+            </a:r>
+          </a:p>
+          <a:p>
+            <a:endParaRPr lang="en-IE" baseline="0" dirty="0" smtClean="0"/>
+          </a:p>
+          <a:p>
+            <a:r>
+              <a:rPr lang="en-IE" baseline="0" dirty="0" smtClean="0"/>
+              <a:t>Hmm. Where is the text gone? Why can’t I see it?</a:t>
+            </a:r>
+          </a:p>
+          <a:p>
+            <a:r>
+              <a:rPr lang="en-IE" baseline="0" dirty="0" smtClean="0"/>
+              <a:t>Because the text and the background are the same colour …</a:t>
+            </a:r>
+          </a:p>
+          <a:p>
+            <a:endParaRPr lang="en-IE" baseline="0" dirty="0" smtClean="0"/>
+          </a:p>
+          <a:p>
+            <a:r>
+              <a:rPr lang="en-IE" baseline="0" dirty="0" smtClean="0"/>
+              <a:t>Set </a:t>
+            </a:r>
+            <a:r>
+              <a:rPr lang="en-IE" baseline="0" dirty="0" err="1" smtClean="0"/>
+              <a:t>color</a:t>
+            </a:r>
+            <a:r>
+              <a:rPr lang="en-IE" baseline="0" dirty="0" smtClean="0"/>
+              <a:t>: </a:t>
+            </a:r>
+            <a:r>
+              <a:rPr lang="en-IE" baseline="0" dirty="0" err="1" smtClean="0"/>
+              <a:t>lightgray</a:t>
+            </a:r>
+            <a:r>
+              <a:rPr lang="en-IE" baseline="0" dirty="0" smtClean="0"/>
+              <a:t>; and the text is back</a:t>
+            </a:r>
+          </a:p>
+          <a:p>
+            <a:endParaRPr lang="en-IE" baseline="0" dirty="0" smtClean="0"/>
+          </a:p>
+          <a:p>
+            <a:r>
+              <a:rPr lang="en-IE" baseline="0" dirty="0" smtClean="0"/>
+              <a:t>The easiest way to demo all of this is to use the “developer tools” in Chrome and turn off the CSS </a:t>
+            </a:r>
+            <a:r>
+              <a:rPr lang="en-IE" baseline="0" smtClean="0"/>
+              <a:t>one row at a time.</a:t>
+            </a:r>
+          </a:p>
+          <a:p>
+            <a:endParaRPr lang="en-IE" baseline="0" dirty="0" smtClean="0"/>
+          </a:p>
+          <a:p>
+            <a:r>
+              <a:rPr lang="en-IE" baseline="0" dirty="0" smtClean="0"/>
+              <a:t>Now: get the kids to find their own background image, background colour </a:t>
+            </a:r>
+            <a:r>
+              <a:rPr lang="en-IE" baseline="0" dirty="0" err="1" smtClean="0"/>
+              <a:t>etc</a:t>
+            </a:r>
+            <a:r>
+              <a:rPr lang="en-IE" baseline="0" dirty="0" smtClean="0"/>
+              <a:t>, and style up their own websites</a:t>
+            </a:r>
+          </a:p>
+          <a:p>
+            <a:r>
+              <a:rPr lang="en-IE" baseline="0" dirty="0" smtClean="0"/>
+              <a:t>Get them to experiment with different colours, images</a:t>
+            </a:r>
+          </a:p>
+          <a:p>
+            <a:endParaRPr lang="en-IE" baseline="0" dirty="0" smtClean="0"/>
+          </a:p>
+          <a:p>
             <a:endParaRPr lang="en-IE" baseline="0" dirty="0" smtClean="0"/>
           </a:p>
         </p:txBody>
@@ -1950,7 +2273,7 @@
           <a:p>
             <a:fld id="{ABE5CB41-8F34-4FAE-BDD8-10A032863583}" type="slidenum">
               <a:rPr lang="en-IE" smtClean="0"/>
-              <a:t>10</a:t>
+              <a:t>9</a:t>
             </a:fld>
             <a:endParaRPr lang="en-IE"/>
           </a:p>
@@ -2212,7 +2535,7 @@
           <a:p>
             <a:fld id="{6D57282B-8A94-4CFA-A812-B2453AD9C772}" type="datetimeFigureOut">
               <a:rPr lang="en-IE" smtClean="0"/>
-              <a:t>10/09/2012</a:t>
+              <a:t>12/09/2012</a:t>
             </a:fld>
             <a:endParaRPr lang="en-IE" dirty="0"/>
           </a:p>
@@ -2435,7 +2758,7 @@
           <a:p>
             <a:fld id="{6D57282B-8A94-4CFA-A812-B2453AD9C772}" type="datetimeFigureOut">
               <a:rPr lang="en-IE" smtClean="0"/>
-              <a:t>10/09/2012</a:t>
+              <a:t>12/09/2012</a:t>
             </a:fld>
             <a:endParaRPr lang="en-IE"/>
           </a:p>
@@ -2715,7 +3038,7 @@
           <a:p>
             <a:fld id="{6D57282B-8A94-4CFA-A812-B2453AD9C772}" type="datetimeFigureOut">
               <a:rPr lang="en-IE" smtClean="0"/>
-              <a:t>10/09/2012</a:t>
+              <a:t>12/09/2012</a:t>
             </a:fld>
             <a:endParaRPr lang="en-IE"/>
           </a:p>
@@ -2894,7 +3217,7 @@
           <a:p>
             <a:fld id="{6D57282B-8A94-4CFA-A812-B2453AD9C772}" type="datetimeFigureOut">
               <a:rPr lang="en-IE" smtClean="0"/>
-              <a:t>10/09/2012</a:t>
+              <a:t>12/09/2012</a:t>
             </a:fld>
             <a:endParaRPr lang="en-IE"/>
           </a:p>
@@ -3288,7 +3611,7 @@
           <a:p>
             <a:fld id="{6D57282B-8A94-4CFA-A812-B2453AD9C772}" type="datetimeFigureOut">
               <a:rPr lang="en-IE" smtClean="0"/>
-              <a:t>10/09/2012</a:t>
+              <a:t>12/09/2012</a:t>
             </a:fld>
             <a:endParaRPr lang="en-IE"/>
           </a:p>
@@ -3575,7 +3898,7 @@
           <a:p>
             <a:fld id="{6D57282B-8A94-4CFA-A812-B2453AD9C772}" type="datetimeFigureOut">
               <a:rPr lang="en-IE" smtClean="0"/>
-              <a:t>10/09/2012</a:t>
+              <a:t>12/09/2012</a:t>
             </a:fld>
             <a:endParaRPr lang="en-IE"/>
           </a:p>
@@ -3997,7 +4320,7 @@
           <a:p>
             <a:fld id="{6D57282B-8A94-4CFA-A812-B2453AD9C772}" type="datetimeFigureOut">
               <a:rPr lang="en-IE" smtClean="0"/>
-              <a:t>10/09/2012</a:t>
+              <a:t>12/09/2012</a:t>
             </a:fld>
             <a:endParaRPr lang="en-IE"/>
           </a:p>
@@ -4112,7 +4435,7 @@
           <a:p>
             <a:fld id="{6D57282B-8A94-4CFA-A812-B2453AD9C772}" type="datetimeFigureOut">
               <a:rPr lang="en-IE" smtClean="0"/>
-              <a:t>10/09/2012</a:t>
+              <a:t>12/09/2012</a:t>
             </a:fld>
             <a:endParaRPr lang="en-IE"/>
           </a:p>
@@ -4202,7 +4525,7 @@
           <a:p>
             <a:fld id="{6D57282B-8A94-4CFA-A812-B2453AD9C772}" type="datetimeFigureOut">
               <a:rPr lang="en-IE" smtClean="0"/>
-              <a:t>10/09/2012</a:t>
+              <a:t>12/09/2012</a:t>
             </a:fld>
             <a:endParaRPr lang="en-IE"/>
           </a:p>
@@ -4480,7 +4803,7 @@
           <a:p>
             <a:fld id="{6D57282B-8A94-4CFA-A812-B2453AD9C772}" type="datetimeFigureOut">
               <a:rPr lang="en-IE" smtClean="0"/>
-              <a:t>10/09/2012</a:t>
+              <a:t>12/09/2012</a:t>
             </a:fld>
             <a:endParaRPr lang="en-IE"/>
           </a:p>
@@ -4841,7 +5164,7 @@
           <a:p>
             <a:fld id="{6D57282B-8A94-4CFA-A812-B2453AD9C772}" type="datetimeFigureOut">
               <a:rPr lang="en-IE" smtClean="0"/>
-              <a:t>10/09/2012</a:t>
+              <a:t>12/09/2012</a:t>
             </a:fld>
             <a:endParaRPr lang="en-IE"/>
           </a:p>
@@ -5278,7 +5601,7 @@
           <a:p>
             <a:fld id="{6D57282B-8A94-4CFA-A812-B2453AD9C772}" type="datetimeFigureOut">
               <a:rPr lang="en-IE" smtClean="0"/>
-              <a:t>10/09/2012</a:t>
+              <a:t>12/09/2012</a:t>
             </a:fld>
             <a:endParaRPr lang="en-IE"/>
           </a:p>
@@ -5739,7 +6062,7 @@
           <p:nvPr/>
         </p:nvPicPr>
         <p:blipFill>
-          <a:blip r:embed="rId2">
+          <a:blip r:embed="rId3">
             <a:extLst>
               <a:ext uri="{28A0092B-C50C-407E-A947-70E740481C1C}">
                 <a14:useLocalDpi xmlns:a14="http://schemas.microsoft.com/office/drawing/2010/main" val="0"/>
@@ -5780,7 +6103,7 @@
         <p:spPr>
           <a:xfrm>
             <a:off x="1847712" y="6329850"/>
-            <a:ext cx="1378904" cy="400110"/>
+            <a:ext cx="2811988" cy="400110"/>
           </a:xfrm>
           <a:prstGeom prst="rect">
             <a:avLst/>
@@ -5795,7 +6118,11 @@
           <a:p>
             <a:r>
               <a:rPr lang="en-US" sz="2000" dirty="0" smtClean="0"/>
-              <a:t>Session #1 </a:t>
+              <a:t>Session #</a:t>
+            </a:r>
+            <a:r>
+              <a:rPr lang="en-US" sz="2000" dirty="0" smtClean="0"/>
+              <a:t>1 : Hello HTML </a:t>
             </a:r>
             <a:endParaRPr lang="en-IE" sz="2000" dirty="0"/>
           </a:p>
@@ -5855,7 +6182,7 @@
           <a:p>
             <a:r>
               <a:rPr lang="en-IE" dirty="0" smtClean="0"/>
-              <a:t>Now Practice Some More!</a:t>
+              <a:t>Publish your web page</a:t>
             </a:r>
             <a:endParaRPr lang="en-IE" dirty="0"/>
           </a:p>
@@ -5874,7 +6201,7 @@
         <p:spPr/>
         <p:txBody>
           <a:bodyPr>
-            <a:normAutofit fontScale="92500" lnSpcReduction="20000"/>
+            <a:normAutofit lnSpcReduction="10000"/>
           </a:bodyPr>
           <a:lstStyle/>
           <a:p>
@@ -5883,7 +6210,7 @@
             </a:pPr>
             <a:r>
               <a:rPr lang="en-IE" dirty="0" smtClean="0"/>
-              <a:t>Now you’ve made and shared your first web page!</a:t>
+              <a:t>So far your web pages live on your laptops only</a:t>
             </a:r>
           </a:p>
           <a:p>
@@ -5897,58 +6224,44 @@
               <a:buNone/>
             </a:pPr>
             <a:r>
-              <a:rPr lang="en-IE" dirty="0"/>
-              <a:t>At home, practice what you learned this week</a:t>
+              <a:rPr lang="en-IE" dirty="0" smtClean="0"/>
+              <a:t>“Publishing” means putting it on the internet for everyone to see</a:t>
             </a:r>
           </a:p>
           <a:p>
             <a:pPr marL="118872" indent="0">
               <a:buNone/>
             </a:pPr>
-            <a:endParaRPr lang="en-IE" dirty="0"/>
-          </a:p>
-          <a:p>
-            <a:pPr marL="118872" indent="0">
-              <a:buNone/>
-            </a:pPr>
-            <a:r>
-              <a:rPr lang="en-IE" dirty="0" smtClean="0"/>
-              <a:t>Try making another page with different pictures and links</a:t>
-            </a:r>
-          </a:p>
-          <a:p>
-            <a:pPr marL="118872" indent="0">
-              <a:buNone/>
-            </a:pPr>
-            <a:endParaRPr lang="en-IE" dirty="0"/>
-          </a:p>
-          <a:p>
-            <a:pPr marL="118872" indent="0">
-              <a:buNone/>
-            </a:pPr>
-            <a:r>
-              <a:rPr lang="en-IE" dirty="0" smtClean="0"/>
-              <a:t>Send us links to your HTML pages at </a:t>
-            </a:r>
-            <a:r>
-              <a:rPr lang="en-IE" b="1" dirty="0" smtClean="0"/>
-              <a:t>bray@coderdojo.com</a:t>
-            </a:r>
-            <a:endParaRPr lang="en-IE" b="1" dirty="0" smtClean="0"/>
-          </a:p>
-          <a:p>
-            <a:pPr marL="118872" indent="0">
-              <a:buNone/>
-            </a:pPr>
-            <a:endParaRPr lang="en-IE" dirty="0"/>
-          </a:p>
-          <a:p>
-            <a:pPr marL="118872" indent="0">
-              <a:buNone/>
-            </a:pPr>
-            <a:r>
-              <a:rPr lang="en-IE" dirty="0" smtClean="0"/>
-              <a:t>See you next week for more HTML</a:t>
+            <a:endParaRPr lang="en-IE" dirty="0" smtClean="0"/>
+          </a:p>
+          <a:p>
+            <a:r>
+              <a:rPr lang="en-IE" dirty="0" smtClean="0"/>
+              <a:t>Go to Mozilla Thimble</a:t>
+            </a:r>
+          </a:p>
+          <a:p>
+            <a:r>
+              <a:rPr lang="en-IE" dirty="0" smtClean="0"/>
+              <a:t>Click “Start from Scratch”</a:t>
+            </a:r>
+          </a:p>
+          <a:p>
+            <a:r>
+              <a:rPr lang="en-IE" dirty="0" smtClean="0"/>
+              <a:t>Paste your webpage code into the Editor</a:t>
+            </a:r>
+          </a:p>
+          <a:p>
+            <a:r>
+              <a:rPr lang="en-IE" dirty="0" smtClean="0"/>
+              <a:t>Click “Publish”</a:t>
+            </a:r>
+          </a:p>
+          <a:p>
+            <a:r>
+              <a:rPr lang="en-IE" dirty="0" smtClean="0"/>
+              <a:t>Copy the URL it gives you … Done!</a:t>
             </a:r>
           </a:p>
           <a:p>
@@ -5962,7 +6275,7 @@
     </p:spTree>
     <p:extLst>
       <p:ext uri="{BB962C8B-B14F-4D97-AF65-F5344CB8AC3E}">
-        <p14:creationId xmlns:p14="http://schemas.microsoft.com/office/powerpoint/2010/main" val="3785644732"/>
+        <p14:creationId xmlns:p14="http://schemas.microsoft.com/office/powerpoint/2010/main" val="644876182"/>
       </p:ext>
     </p:extLst>
   </p:cSld>
@@ -6013,6 +6326,178 @@
           <a:p>
             <a:r>
               <a:rPr lang="en-IE" dirty="0" smtClean="0"/>
+              <a:t>Now Practice Some More!</a:t>
+            </a:r>
+            <a:endParaRPr lang="en-IE" dirty="0"/>
+          </a:p>
+        </p:txBody>
+      </p:sp>
+      <p:sp>
+        <p:nvSpPr>
+          <p:cNvPr id="3" name="Content Placeholder 2"/>
+          <p:cNvSpPr>
+            <a:spLocks noGrp="1"/>
+          </p:cNvSpPr>
+          <p:nvPr>
+            <p:ph idx="1"/>
+          </p:nvPr>
+        </p:nvSpPr>
+        <p:spPr/>
+        <p:txBody>
+          <a:bodyPr>
+            <a:normAutofit fontScale="85000" lnSpcReduction="20000"/>
+          </a:bodyPr>
+          <a:lstStyle/>
+          <a:p>
+            <a:pPr marL="118872" indent="0">
+              <a:buNone/>
+            </a:pPr>
+            <a:r>
+              <a:rPr lang="en-IE" dirty="0" smtClean="0"/>
+              <a:t>Now you’ve made and shared your first web page!</a:t>
+            </a:r>
+          </a:p>
+          <a:p>
+            <a:pPr marL="118872" indent="0">
+              <a:buNone/>
+            </a:pPr>
+            <a:endParaRPr lang="en-IE" dirty="0" smtClean="0"/>
+          </a:p>
+          <a:p>
+            <a:pPr marL="118872" indent="0">
+              <a:buNone/>
+            </a:pPr>
+            <a:r>
+              <a:rPr lang="en-IE" dirty="0"/>
+              <a:t>At home, practice what you learned this week</a:t>
+            </a:r>
+          </a:p>
+          <a:p>
+            <a:pPr marL="118872" indent="0">
+              <a:buNone/>
+            </a:pPr>
+            <a:endParaRPr lang="en-IE" dirty="0"/>
+          </a:p>
+          <a:p>
+            <a:pPr marL="118872" indent="0">
+              <a:buNone/>
+            </a:pPr>
+            <a:r>
+              <a:rPr lang="en-IE" dirty="0" smtClean="0"/>
+              <a:t>Try making another page with different pictures and links</a:t>
+            </a:r>
+          </a:p>
+          <a:p>
+            <a:pPr marL="118872" indent="0">
+              <a:buNone/>
+            </a:pPr>
+            <a:endParaRPr lang="en-IE" dirty="0" smtClean="0"/>
+          </a:p>
+          <a:p>
+            <a:pPr marL="118872" indent="0">
+              <a:buNone/>
+            </a:pPr>
+            <a:r>
+              <a:rPr lang="en-IE" dirty="0" smtClean="0"/>
+              <a:t>Try embedding YouTube video instead of a Google Map</a:t>
+            </a:r>
+          </a:p>
+          <a:p>
+            <a:pPr marL="118872" indent="0">
+              <a:buNone/>
+            </a:pPr>
+            <a:endParaRPr lang="en-IE" dirty="0"/>
+          </a:p>
+          <a:p>
+            <a:pPr marL="118872" indent="0">
+              <a:buNone/>
+            </a:pPr>
+            <a:r>
+              <a:rPr lang="en-IE" dirty="0" smtClean="0"/>
+              <a:t>Send us links to your HTML pages at </a:t>
+            </a:r>
+            <a:r>
+              <a:rPr lang="en-IE" b="1" dirty="0" smtClean="0"/>
+              <a:t>bray@coderdojo.com</a:t>
+            </a:r>
+          </a:p>
+          <a:p>
+            <a:pPr marL="118872" indent="0">
+              <a:buNone/>
+            </a:pPr>
+            <a:endParaRPr lang="en-IE" dirty="0"/>
+          </a:p>
+          <a:p>
+            <a:pPr marL="118872" indent="0">
+              <a:buNone/>
+            </a:pPr>
+            <a:r>
+              <a:rPr lang="en-IE" dirty="0" smtClean="0"/>
+              <a:t>See you next week for more HTML</a:t>
+            </a:r>
+          </a:p>
+          <a:p>
+            <a:pPr marL="118872" indent="0">
+              <a:buNone/>
+            </a:pPr>
+            <a:endParaRPr lang="en-IE" sz="2800" dirty="0" smtClean="0"/>
+          </a:p>
+        </p:txBody>
+      </p:sp>
+    </p:spTree>
+    <p:extLst>
+      <p:ext uri="{BB962C8B-B14F-4D97-AF65-F5344CB8AC3E}">
+        <p14:creationId xmlns:p14="http://schemas.microsoft.com/office/powerpoint/2010/main" val="3785644732"/>
+      </p:ext>
+    </p:extLst>
+  </p:cSld>
+  <p:clrMapOvr>
+    <a:masterClrMapping/>
+  </p:clrMapOvr>
+  <p:timing>
+    <p:tnLst>
+      <p:par>
+        <p:cTn id="1" dur="indefinite" restart="never" nodeType="tmRoot"/>
+      </p:par>
+    </p:tnLst>
+  </p:timing>
+</p:sld>
+</file>
+
+<file path=ppt/slides/slide12.xml><?xml version="1.0" encoding="utf-8"?>
+<p:sld xmlns:a="http://schemas.openxmlformats.org/drawingml/2006/main" xmlns:r="http://schemas.openxmlformats.org/officeDocument/2006/relationships" xmlns:p="http://schemas.openxmlformats.org/presentationml/2006/main">
+  <p:cSld>
+    <p:spTree>
+      <p:nvGrpSpPr>
+        <p:cNvPr id="1" name=""/>
+        <p:cNvGrpSpPr/>
+        <p:nvPr/>
+      </p:nvGrpSpPr>
+      <p:grpSpPr>
+        <a:xfrm>
+          <a:off x="0" y="0"/>
+          <a:ext cx="0" cy="0"/>
+          <a:chOff x="0" y="0"/>
+          <a:chExt cx="0" cy="0"/>
+        </a:xfrm>
+      </p:grpSpPr>
+      <p:sp>
+        <p:nvSpPr>
+          <p:cNvPr id="2" name="Title 1"/>
+          <p:cNvSpPr>
+            <a:spLocks noGrp="1"/>
+          </p:cNvSpPr>
+          <p:nvPr>
+            <p:ph type="title"/>
+          </p:nvPr>
+        </p:nvSpPr>
+        <p:spPr/>
+        <p:txBody>
+          <a:bodyPr/>
+          <a:lstStyle/>
+          <a:p>
+            <a:r>
+              <a:rPr lang="en-IE" dirty="0" smtClean="0"/>
               <a:t>Next Week …</a:t>
             </a:r>
             <a:endParaRPr lang="en-IE" dirty="0"/>
@@ -6065,8 +6550,13 @@
           <a:p>
             <a:r>
               <a:rPr lang="en-US" dirty="0" smtClean="0"/>
-              <a:t>We’ll start to look a bit more at CSS</a:t>
-            </a:r>
+              <a:t>We’ll start to look a bit more at </a:t>
+            </a:r>
+            <a:r>
+              <a:rPr lang="en-US" dirty="0" smtClean="0"/>
+              <a:t>CSS to turn a list into a menu</a:t>
+            </a:r>
+            <a:endParaRPr lang="en-US" dirty="0" smtClean="0"/>
           </a:p>
           <a:p>
             <a:endParaRPr lang="en-US" dirty="0"/>
@@ -6129,108 +6619,80 @@
             <p:ph type="title"/>
           </p:nvPr>
         </p:nvSpPr>
-        <p:spPr>
-          <a:xfrm>
-            <a:off x="1571625" y="155448"/>
-            <a:ext cx="7115175" cy="1252728"/>
-          </a:xfrm>
-        </p:spPr>
-        <p:txBody>
-          <a:bodyPr>
-            <a:normAutofit fontScale="90000"/>
-          </a:bodyPr>
-          <a:lstStyle/>
-          <a:p>
-            <a:r>
-              <a:rPr lang="en-IE" dirty="0" smtClean="0"/>
-              <a:t>Session #1</a:t>
-            </a:r>
-            <a:br>
-              <a:rPr lang="en-IE" dirty="0" smtClean="0"/>
-            </a:br>
-            <a:r>
-              <a:rPr lang="en-IE" dirty="0" smtClean="0"/>
-              <a:t>What will you do today?</a:t>
-            </a:r>
-            <a:endParaRPr lang="en-IE" dirty="0"/>
-          </a:p>
-        </p:txBody>
-      </p:sp>
-      <p:sp>
-        <p:nvSpPr>
-          <p:cNvPr id="3" name="Content Placeholder 2"/>
-          <p:cNvSpPr>
-            <a:spLocks noGrp="1"/>
-          </p:cNvSpPr>
-          <p:nvPr>
-            <p:ph idx="1"/>
-          </p:nvPr>
-        </p:nvSpPr>
         <p:spPr/>
         <p:txBody>
           <a:bodyPr/>
           <a:lstStyle/>
           <a:p>
-            <a:endParaRPr lang="en-IE" dirty="0" smtClean="0"/>
-          </a:p>
-          <a:p>
-            <a:r>
-              <a:rPr lang="en-IE" dirty="0" smtClean="0"/>
-              <a:t>Make your first web page</a:t>
-            </a:r>
-          </a:p>
-          <a:p>
-            <a:r>
-              <a:rPr lang="en-IE" dirty="0" smtClean="0"/>
-              <a:t>.. with text</a:t>
-            </a:r>
-          </a:p>
-          <a:p>
-            <a:r>
-              <a:rPr lang="en-IE" dirty="0" smtClean="0"/>
-              <a:t>… and pictures </a:t>
-            </a:r>
-          </a:p>
-          <a:p>
-            <a:r>
-              <a:rPr lang="en-IE" dirty="0" smtClean="0"/>
-              <a:t>…… and video</a:t>
-            </a:r>
-          </a:p>
-          <a:p>
-            <a:r>
-              <a:rPr lang="en-IE" dirty="0" smtClean="0"/>
-              <a:t>……… and put it on the internet</a:t>
-            </a:r>
-          </a:p>
-          <a:p>
+            <a:r>
+              <a:rPr lang="en-IE" dirty="0" err="1" smtClean="0"/>
+              <a:t>WiFi</a:t>
+            </a:r>
+            <a:r>
+              <a:rPr lang="en-IE" dirty="0" smtClean="0"/>
+              <a:t> Network</a:t>
+            </a:r>
             <a:endParaRPr lang="en-IE" dirty="0"/>
           </a:p>
-          <a:p>
-            <a:r>
-              <a:rPr lang="en-IE" dirty="0" smtClean="0"/>
-              <a:t>Just HTML (and a bit of CSS)</a:t>
-            </a:r>
+        </p:txBody>
+      </p:sp>
+      <p:sp>
+        <p:nvSpPr>
+          <p:cNvPr id="3" name="Content Placeholder 2"/>
+          <p:cNvSpPr>
+            <a:spLocks noGrp="1"/>
+          </p:cNvSpPr>
+          <p:nvPr>
+            <p:ph idx="1"/>
+          </p:nvPr>
+        </p:nvSpPr>
+        <p:spPr/>
+        <p:txBody>
+          <a:bodyPr/>
+          <a:lstStyle/>
+          <a:p>
+            <a:r>
+              <a:rPr lang="en-IE" sz="6600" dirty="0" smtClean="0"/>
+              <a:t>Wireless network is: </a:t>
+            </a:r>
+            <a:br>
+              <a:rPr lang="en-IE" sz="6600" dirty="0" smtClean="0"/>
+            </a:br>
+            <a:r>
+              <a:rPr lang="en-IE" sz="6600" dirty="0" smtClean="0"/>
+              <a:t/>
+            </a:r>
+            <a:br>
+              <a:rPr lang="en-IE" sz="6600" dirty="0" smtClean="0"/>
+            </a:br>
+            <a:r>
+              <a:rPr lang="en-IE" sz="6600" dirty="0" smtClean="0"/>
+              <a:t>       </a:t>
+            </a:r>
+            <a:r>
+              <a:rPr lang="en-IE" sz="8800" b="1" dirty="0" err="1" smtClean="0"/>
+              <a:t>coderdojo</a:t>
+            </a:r>
+            <a:endParaRPr lang="en-IE" sz="8800" b="1" dirty="0" smtClean="0"/>
+          </a:p>
+          <a:p>
+            <a:pPr marL="118872" indent="0">
+              <a:buNone/>
+            </a:pPr>
+            <a:endParaRPr lang="en-IE" b="1" dirty="0"/>
           </a:p>
         </p:txBody>
       </p:sp>
     </p:spTree>
     <p:extLst>
       <p:ext uri="{BB962C8B-B14F-4D97-AF65-F5344CB8AC3E}">
-        <p14:creationId xmlns:p14="http://schemas.microsoft.com/office/powerpoint/2010/main" val="621390032"/>
+        <p14:creationId xmlns:p14="http://schemas.microsoft.com/office/powerpoint/2010/main" val="3411813690"/>
       </p:ext>
     </p:extLst>
   </p:cSld>
   <p:clrMapOvr>
     <a:masterClrMapping/>
   </p:clrMapOvr>
-  <p:timing>
-    <p:tnLst>
-      <p:par>
-        <p:cTn id="1" dur="indefinite" restart="never" nodeType="tmRoot"/>
-      </p:par>
-    </p:tnLst>
-  </p:timing>
 </p:sld>
 </file>
 
@@ -6261,113 +6723,95 @@
             <p:ph type="title"/>
           </p:nvPr>
         </p:nvSpPr>
+        <p:spPr>
+          <a:xfrm>
+            <a:off x="1571625" y="155448"/>
+            <a:ext cx="7115175" cy="1252728"/>
+          </a:xfrm>
+        </p:spPr>
+        <p:txBody>
+          <a:bodyPr>
+            <a:normAutofit fontScale="90000"/>
+          </a:bodyPr>
+          <a:lstStyle/>
+          <a:p>
+            <a:r>
+              <a:rPr lang="en-IE" dirty="0" smtClean="0"/>
+              <a:t>Session #1</a:t>
+            </a:r>
+            <a:br>
+              <a:rPr lang="en-IE" dirty="0" smtClean="0"/>
+            </a:br>
+            <a:r>
+              <a:rPr lang="en-IE" dirty="0" smtClean="0"/>
+              <a:t>What will you do today?</a:t>
+            </a:r>
+            <a:endParaRPr lang="en-IE" dirty="0"/>
+          </a:p>
+        </p:txBody>
+      </p:sp>
+      <p:sp>
+        <p:nvSpPr>
+          <p:cNvPr id="3" name="Content Placeholder 2"/>
+          <p:cNvSpPr>
+            <a:spLocks noGrp="1"/>
+          </p:cNvSpPr>
+          <p:nvPr>
+            <p:ph idx="1"/>
+          </p:nvPr>
+        </p:nvSpPr>
         <p:spPr/>
         <p:txBody>
           <a:bodyPr/>
           <a:lstStyle/>
           <a:p>
-            <a:r>
-              <a:rPr lang="en-IE" dirty="0" smtClean="0"/>
-              <a:t>What do you need?</a:t>
-            </a:r>
+            <a:endParaRPr lang="en-IE" dirty="0" smtClean="0"/>
+          </a:p>
+          <a:p>
+            <a:r>
+              <a:rPr lang="en-IE" dirty="0" smtClean="0"/>
+              <a:t>Make your first web page</a:t>
+            </a:r>
+          </a:p>
+          <a:p>
+            <a:r>
+              <a:rPr lang="en-IE" dirty="0" smtClean="0"/>
+              <a:t>.. with text</a:t>
+            </a:r>
+          </a:p>
+          <a:p>
+            <a:r>
+              <a:rPr lang="en-IE" dirty="0" smtClean="0"/>
+              <a:t>… and pictures </a:t>
+            </a:r>
+          </a:p>
+          <a:p>
+            <a:r>
+              <a:rPr lang="en-IE" dirty="0" smtClean="0"/>
+              <a:t>…… and video</a:t>
+            </a:r>
+          </a:p>
+          <a:p>
+            <a:r>
+              <a:rPr lang="en-IE" dirty="0" smtClean="0"/>
+              <a:t>……… and put it on the internet</a:t>
+            </a:r>
+          </a:p>
+          <a:p>
             <a:endParaRPr lang="en-IE" dirty="0"/>
           </a:p>
-        </p:txBody>
-      </p:sp>
-      <p:sp>
-        <p:nvSpPr>
-          <p:cNvPr id="3" name="Content Placeholder 2"/>
-          <p:cNvSpPr>
-            <a:spLocks noGrp="1"/>
-          </p:cNvSpPr>
-          <p:nvPr>
-            <p:ph idx="1"/>
-          </p:nvPr>
-        </p:nvSpPr>
-        <p:spPr/>
-        <p:txBody>
-          <a:bodyPr>
-            <a:normAutofit fontScale="92500" lnSpcReduction="20000"/>
-          </a:bodyPr>
-          <a:lstStyle/>
-          <a:p>
-            <a:r>
-              <a:rPr lang="en-IE" dirty="0" smtClean="0"/>
-              <a:t>Well, a computer to start with … </a:t>
-            </a:r>
-          </a:p>
-          <a:p>
-            <a:r>
-              <a:rPr lang="en-IE" dirty="0" smtClean="0"/>
-              <a:t>An editor </a:t>
-            </a:r>
-          </a:p>
-          <a:p>
-            <a:pPr lvl="1"/>
-            <a:r>
-              <a:rPr lang="en-IE" dirty="0" smtClean="0"/>
-              <a:t>To write your HTML code</a:t>
-            </a:r>
-          </a:p>
-          <a:p>
-            <a:pPr lvl="1"/>
-            <a:r>
-              <a:rPr lang="en-IE" dirty="0" smtClean="0"/>
-              <a:t>Komodo Edit </a:t>
-            </a:r>
-            <a:endParaRPr lang="en-IE" dirty="0"/>
-          </a:p>
-          <a:p>
-            <a:pPr lvl="2"/>
-            <a:r>
-              <a:rPr lang="en-IE" dirty="0" smtClean="0"/>
-              <a:t>Or Notepad++, or </a:t>
-            </a:r>
-            <a:r>
-              <a:rPr lang="en-IE" dirty="0" err="1" smtClean="0"/>
-              <a:t>TextWrangler</a:t>
-            </a:r>
-            <a:endParaRPr lang="en-IE" dirty="0" smtClean="0"/>
-          </a:p>
-          <a:p>
-            <a:r>
-              <a:rPr lang="en-IE" dirty="0" smtClean="0"/>
-              <a:t>A web browser</a:t>
-            </a:r>
-          </a:p>
-          <a:p>
-            <a:pPr lvl="1"/>
-            <a:r>
-              <a:rPr lang="en-IE" dirty="0" smtClean="0"/>
-              <a:t>Google Chrome, Firefox, Safari, Internet Explorer</a:t>
-            </a:r>
-          </a:p>
-          <a:p>
-            <a:r>
-              <a:rPr lang="en-IE" dirty="0" smtClean="0"/>
-              <a:t>A wireless network connection</a:t>
-            </a:r>
-          </a:p>
-          <a:p>
-            <a:pPr lvl="1"/>
-            <a:r>
-              <a:rPr lang="en-IE" dirty="0" smtClean="0"/>
-              <a:t>To see the internet, get images, and publish your website</a:t>
-            </a:r>
-          </a:p>
-          <a:p>
-            <a:r>
-              <a:rPr lang="en-IE" dirty="0" smtClean="0"/>
-              <a:t>… let’s take some time to get setup … </a:t>
-            </a:r>
-            <a:endParaRPr lang="en-IE" dirty="0"/>
+          <a:p>
+            <a:r>
+              <a:rPr lang="en-IE" dirty="0" smtClean="0"/>
+              <a:t>Just HTML (and a bit of CSS)</a:t>
+            </a:r>
           </a:p>
         </p:txBody>
       </p:sp>
     </p:spTree>
     <p:extLst>
       <p:ext uri="{BB962C8B-B14F-4D97-AF65-F5344CB8AC3E}">
-        <p14:creationId xmlns:p14="http://schemas.microsoft.com/office/powerpoint/2010/main" val="446287894"/>
+        <p14:creationId xmlns:p14="http://schemas.microsoft.com/office/powerpoint/2010/main" val="621390032"/>
       </p:ext>
     </p:extLst>
   </p:cSld>
@@ -6418,7 +6862,7 @@
           <a:p>
             <a:r>
               <a:rPr lang="en-IE" dirty="0" smtClean="0"/>
-              <a:t>What does HTML look like?</a:t>
+              <a:t>What do you need?</a:t>
             </a:r>
             <a:endParaRPr lang="en-IE" dirty="0"/>
           </a:p>
@@ -6437,111 +6881,82 @@
         <p:spPr/>
         <p:txBody>
           <a:bodyPr>
-            <a:normAutofit lnSpcReduction="10000"/>
+            <a:normAutofit fontScale="92500" lnSpcReduction="20000"/>
           </a:bodyPr>
           <a:lstStyle/>
           <a:p>
-            <a:pPr marL="118872" indent="0">
-              <a:buNone/>
-            </a:pPr>
-            <a:r>
-              <a:rPr lang="en-IE" dirty="0" smtClean="0"/>
-              <a:t>&lt;html&gt;</a:t>
-            </a:r>
-          </a:p>
-          <a:p>
-            <a:pPr marL="118872" indent="0">
-              <a:buNone/>
-            </a:pPr>
-            <a:r>
-              <a:rPr lang="en-IE" dirty="0"/>
-              <a:t> </a:t>
-            </a:r>
-            <a:r>
-              <a:rPr lang="en-IE" dirty="0" smtClean="0"/>
-              <a:t>   &lt;head&gt;</a:t>
-            </a:r>
-          </a:p>
-          <a:p>
-            <a:pPr marL="118872" indent="0">
-              <a:buNone/>
-            </a:pPr>
-            <a:r>
-              <a:rPr lang="en-IE" dirty="0"/>
-              <a:t>	</a:t>
-            </a:r>
-            <a:r>
-              <a:rPr lang="en-IE" dirty="0" smtClean="0"/>
-              <a:t>&lt;title&gt;Hello, World!&lt;/title&gt;</a:t>
-            </a:r>
-          </a:p>
-          <a:p>
-            <a:pPr marL="118872" indent="0">
-              <a:buNone/>
-            </a:pPr>
-            <a:r>
-              <a:rPr lang="en-IE" dirty="0"/>
-              <a:t> </a:t>
-            </a:r>
-            <a:r>
-              <a:rPr lang="en-IE" dirty="0" smtClean="0"/>
-              <a:t>   &lt;/head&gt;</a:t>
-            </a:r>
-          </a:p>
-          <a:p>
-            <a:pPr marL="118872" indent="0">
-              <a:buNone/>
-            </a:pPr>
+            <a:r>
+              <a:rPr lang="en-IE" dirty="0" smtClean="0"/>
+              <a:t>Well, a computer to start with … </a:t>
+            </a:r>
+          </a:p>
+          <a:p>
+            <a:r>
+              <a:rPr lang="en-IE" dirty="0" smtClean="0"/>
+              <a:t>An editor </a:t>
+            </a:r>
+          </a:p>
+          <a:p>
+            <a:pPr lvl="1"/>
+            <a:r>
+              <a:rPr lang="en-IE" dirty="0" smtClean="0"/>
+              <a:t>To write your HTML code</a:t>
+            </a:r>
+          </a:p>
+          <a:p>
+            <a:pPr lvl="1"/>
+            <a:r>
+              <a:rPr lang="en-IE" dirty="0" smtClean="0"/>
+              <a:t>Komodo Edit </a:t>
+            </a:r>
+            <a:endParaRPr lang="en-IE" dirty="0"/>
+          </a:p>
+          <a:p>
+            <a:pPr lvl="2"/>
+            <a:r>
+              <a:rPr lang="en-IE" dirty="0" smtClean="0"/>
+              <a:t>Or Notepad++, or </a:t>
+            </a:r>
+            <a:r>
+              <a:rPr lang="en-IE" dirty="0" err="1" smtClean="0"/>
+              <a:t>TextWrangler</a:t>
+            </a:r>
             <a:endParaRPr lang="en-IE" dirty="0" smtClean="0"/>
           </a:p>
           <a:p>
-            <a:pPr marL="118872" indent="0">
-              <a:buNone/>
-            </a:pPr>
-            <a:r>
-              <a:rPr lang="en-IE" dirty="0" smtClean="0"/>
-              <a:t>    &lt;body&gt;</a:t>
-            </a:r>
-          </a:p>
-          <a:p>
-            <a:pPr marL="118872" indent="0">
-              <a:buNone/>
-            </a:pPr>
-            <a:r>
-              <a:rPr lang="en-IE" dirty="0"/>
-              <a:t>	</a:t>
-            </a:r>
-            <a:r>
-              <a:rPr lang="en-IE" dirty="0" smtClean="0"/>
-              <a:t>It’s me!</a:t>
-            </a:r>
-          </a:p>
-          <a:p>
-            <a:pPr marL="118872" indent="0">
-              <a:buNone/>
-            </a:pPr>
-            <a:r>
-              <a:rPr lang="en-IE" dirty="0"/>
-              <a:t> </a:t>
-            </a:r>
-            <a:r>
-              <a:rPr lang="en-IE" dirty="0" smtClean="0"/>
-              <a:t>   &lt;/body&gt;</a:t>
-            </a:r>
-          </a:p>
-          <a:p>
-            <a:pPr marL="118872" indent="0">
-              <a:buNone/>
-            </a:pPr>
-            <a:endParaRPr lang="en-IE" dirty="0" smtClean="0"/>
-          </a:p>
-          <a:p>
-            <a:pPr marL="118872" indent="0">
-              <a:buNone/>
-            </a:pPr>
-            <a:r>
-              <a:rPr lang="en-IE" dirty="0" smtClean="0"/>
-              <a:t>&lt;/html&gt;</a:t>
+            <a:r>
+              <a:rPr lang="en-IE" dirty="0" smtClean="0"/>
+              <a:t>A web browser</a:t>
+            </a:r>
+          </a:p>
+          <a:p>
+            <a:pPr lvl="1"/>
+            <a:r>
+              <a:rPr lang="en-IE" dirty="0" smtClean="0"/>
+              <a:t>Google Chrome, Firefox, Safari, Internet Explorer</a:t>
+            </a:r>
+          </a:p>
+          <a:p>
+            <a:r>
+              <a:rPr lang="en-IE" dirty="0" smtClean="0"/>
+              <a:t>A wireless network connection</a:t>
+            </a:r>
+          </a:p>
+          <a:p>
+            <a:pPr lvl="1"/>
+            <a:r>
+              <a:rPr lang="en-IE" dirty="0" smtClean="0"/>
+              <a:t>To see the internet, get images, and publish your website</a:t>
+            </a:r>
+          </a:p>
+          <a:p>
+            <a:r>
+              <a:rPr lang="en-IE" dirty="0" smtClean="0"/>
+              <a:t>… </a:t>
+            </a:r>
+            <a:r>
+              <a:rPr lang="en-IE" dirty="0" smtClean="0"/>
+              <a:t>if you need help setting up, call a mentor … </a:t>
             </a:r>
             <a:endParaRPr lang="en-IE" dirty="0"/>
           </a:p>
@@ -6550,7 +6965,7 @@
     </p:spTree>
     <p:extLst>
       <p:ext uri="{BB962C8B-B14F-4D97-AF65-F5344CB8AC3E}">
-        <p14:creationId xmlns:p14="http://schemas.microsoft.com/office/powerpoint/2010/main" val="4210354779"/>
+        <p14:creationId xmlns:p14="http://schemas.microsoft.com/office/powerpoint/2010/main" val="446287894"/>
       </p:ext>
     </p:extLst>
   </p:cSld>
@@ -6601,7 +7016,7 @@
           <a:p>
             <a:r>
               <a:rPr lang="en-IE" dirty="0" smtClean="0"/>
-              <a:t>Some HTML tags to try</a:t>
+              <a:t>What does HTML look like?</a:t>
             </a:r>
             <a:endParaRPr lang="en-IE" dirty="0"/>
           </a:p>
@@ -6620,7 +7035,7 @@
         <p:spPr/>
         <p:txBody>
           <a:bodyPr>
-            <a:normAutofit/>
+            <a:normAutofit lnSpcReduction="10000"/>
           </a:bodyPr>
           <a:lstStyle/>
           <a:p>
@@ -6629,7 +7044,46 @@
             </a:pPr>
             <a:r>
               <a:rPr lang="en-IE" dirty="0" smtClean="0"/>
-              <a:t>Now let’s make a page using some tags</a:t>
+              <a:t>&lt;html&gt;</a:t>
+            </a:r>
+          </a:p>
+          <a:p>
+            <a:pPr marL="118872" indent="0">
+              <a:buNone/>
+            </a:pPr>
+            <a:r>
+              <a:rPr lang="en-IE" dirty="0"/>
+              <a:t> </a:t>
+            </a:r>
+            <a:r>
+              <a:rPr lang="en-IE" dirty="0" smtClean="0"/>
+              <a:t>   &lt;head&gt;</a:t>
+            </a:r>
+          </a:p>
+          <a:p>
+            <a:pPr marL="118872" indent="0">
+              <a:buNone/>
+            </a:pPr>
+            <a:r>
+              <a:rPr lang="en-IE" dirty="0"/>
+              <a:t>	</a:t>
+            </a:r>
+            <a:r>
+              <a:rPr lang="en-IE" dirty="0" smtClean="0"/>
+              <a:t>&lt;title&gt;Hello, World!&lt;/title&gt;</a:t>
+            </a:r>
+          </a:p>
+          <a:p>
+            <a:pPr marL="118872" indent="0">
+              <a:buNone/>
+            </a:pPr>
+            <a:r>
+              <a:rPr lang="en-IE" dirty="0"/>
+              <a:t> </a:t>
+            </a:r>
+            <a:r>
+              <a:rPr lang="en-IE" dirty="0" smtClean="0"/>
+              <a:t>   &lt;/head&gt;</a:t>
             </a:r>
           </a:p>
           <a:p>
@@ -6644,7 +7098,7 @@
             </a:pPr>
             <a:r>
               <a:rPr lang="en-IE" dirty="0" smtClean="0"/>
-              <a:t>&lt;h1&gt;Big text&lt;/h1&gt;</a:t>
+              <a:t>    &lt;body&gt;</a:t>
             </a:r>
           </a:p>
           <a:p>
@@ -6652,8 +7106,12 @@
               <a:buNone/>
             </a:pPr>
             <a:r>
-              <a:rPr lang="en-IE" dirty="0" smtClean="0"/>
-              <a:t>&lt;h2&gt;Smaller text&lt;/h2&gt;</a:t>
+              <a:rPr lang="en-IE" dirty="0"/>
+              <a:t>	</a:t>
+            </a:r>
+            <a:r>
+              <a:rPr lang="en-IE" dirty="0" smtClean="0"/>
+              <a:t>It’s me!</a:t>
             </a:r>
           </a:p>
           <a:p>
@@ -6661,26 +7119,19 @@
               <a:buNone/>
             </a:pPr>
             <a:r>
-              <a:rPr lang="en-IE" dirty="0" smtClean="0"/>
-              <a:t>&lt;</a:t>
-            </a:r>
-            <a:r>
-              <a:rPr lang="en-IE" dirty="0" err="1" smtClean="0"/>
-              <a:t>br</a:t>
-            </a:r>
-            <a:r>
-              <a:rPr lang="en-IE" dirty="0" smtClean="0"/>
-              <a:t>/&gt;</a:t>
+              <a:rPr lang="en-IE" dirty="0"/>
+              <a:t> </a:t>
+            </a:r>
+            <a:r>
+              <a:rPr lang="en-IE" dirty="0" smtClean="0"/>
+              <a:t>   &lt;/body&gt;</a:t>
             </a:r>
           </a:p>
           <a:p>
             <a:pPr marL="118872" indent="0">
               <a:buNone/>
             </a:pPr>
-            <a:r>
-              <a:rPr lang="en-IE" dirty="0" smtClean="0"/>
-              <a:t>&lt;p&gt;</a:t>
-            </a:r>
+            <a:endParaRPr lang="en-IE" dirty="0" smtClean="0"/>
           </a:p>
           <a:p>
             <a:pPr marL="118872" indent="0">
@@ -6688,56 +7139,7 @@
             </a:pPr>
             <a:r>
               <a:rPr lang="en-IE" dirty="0" smtClean="0"/>
-              <a:t>&lt;</a:t>
-            </a:r>
-            <a:r>
-              <a:rPr lang="en-IE" dirty="0" err="1" smtClean="0"/>
-              <a:t>img</a:t>
-            </a:r>
-            <a:r>
-              <a:rPr lang="en-IE" dirty="0" smtClean="0"/>
-              <a:t> </a:t>
-            </a:r>
-            <a:r>
-              <a:rPr lang="en-IE" dirty="0" err="1" smtClean="0"/>
-              <a:t>src</a:t>
-            </a:r>
-            <a:r>
-              <a:rPr lang="en-IE" dirty="0" smtClean="0"/>
-              <a:t>=“</a:t>
-            </a:r>
-            <a:r>
-              <a:rPr lang="en-IE" dirty="0" err="1" smtClean="0"/>
-              <a:t>url</a:t>
-            </a:r>
-            <a:r>
-              <a:rPr lang="en-IE" dirty="0" smtClean="0"/>
-              <a:t>” /&gt;</a:t>
-            </a:r>
-          </a:p>
-          <a:p>
-            <a:pPr marL="118872" indent="0">
-              <a:buNone/>
-            </a:pPr>
-            <a:r>
-              <a:rPr lang="en-IE" dirty="0" smtClean="0"/>
-              <a:t>&lt;a </a:t>
-            </a:r>
-            <a:r>
-              <a:rPr lang="en-IE" dirty="0" err="1" smtClean="0"/>
-              <a:t>href</a:t>
-            </a:r>
-            <a:r>
-              <a:rPr lang="en-IE" dirty="0" smtClean="0"/>
-              <a:t>=“</a:t>
-            </a:r>
-            <a:r>
-              <a:rPr lang="en-IE" dirty="0" err="1" smtClean="0"/>
-              <a:t>url</a:t>
-            </a:r>
-            <a:r>
-              <a:rPr lang="en-IE" dirty="0" smtClean="0"/>
-              <a:t>”&gt; A link to another page &lt;/a&gt;</a:t>
+              <a:t>&lt;/html&gt;</a:t>
             </a:r>
             <a:endParaRPr lang="en-IE" dirty="0"/>
           </a:p>
@@ -6746,7 +7148,7 @@
     </p:spTree>
     <p:extLst>
       <p:ext uri="{BB962C8B-B14F-4D97-AF65-F5344CB8AC3E}">
-        <p14:creationId xmlns:p14="http://schemas.microsoft.com/office/powerpoint/2010/main" val="136623678"/>
+        <p14:creationId xmlns:p14="http://schemas.microsoft.com/office/powerpoint/2010/main" val="4210354779"/>
       </p:ext>
     </p:extLst>
   </p:cSld>
@@ -6797,7 +7199,7 @@
           <a:p>
             <a:r>
               <a:rPr lang="en-IE" dirty="0" smtClean="0"/>
-              <a:t>Some More Tags</a:t>
+              <a:t>Some HTML tags to try</a:t>
             </a:r>
             <a:endParaRPr lang="en-IE" dirty="0"/>
           </a:p>
@@ -6825,87 +7227,124 @@
             </a:pPr>
             <a:r>
               <a:rPr lang="en-IE" dirty="0" smtClean="0"/>
-              <a:t>Let’s add some movement</a:t>
+              <a:t>Now let’s make a page using some tags</a:t>
             </a:r>
           </a:p>
           <a:p>
             <a:pPr marL="118872" indent="0">
               <a:buNone/>
             </a:pPr>
+            <a:endParaRPr lang="en-IE" dirty="0" smtClean="0"/>
+          </a:p>
+          <a:p>
+            <a:pPr marL="118872" indent="0">
+              <a:buNone/>
+            </a:pPr>
+            <a:r>
+              <a:rPr lang="en-IE" dirty="0" smtClean="0"/>
+              <a:t>&lt;h1&gt;Big text&lt;/h1&gt;</a:t>
+            </a:r>
+          </a:p>
+          <a:p>
+            <a:pPr marL="118872" indent="0">
+              <a:buNone/>
+            </a:pPr>
+            <a:r>
+              <a:rPr lang="en-IE" dirty="0" smtClean="0"/>
+              <a:t>&lt;h2&gt;Smaller text&lt;/h2&gt;</a:t>
+            </a:r>
+          </a:p>
+          <a:p>
+            <a:pPr marL="118872" indent="0">
+              <a:buNone/>
+            </a:pPr>
+            <a:r>
+              <a:rPr lang="en-IE" dirty="0" smtClean="0"/>
+              <a:t>&lt;</a:t>
+            </a:r>
+            <a:r>
+              <a:rPr lang="en-IE" dirty="0" err="1" smtClean="0"/>
+              <a:t>br</a:t>
+            </a:r>
+            <a:r>
+              <a:rPr lang="en-IE" dirty="0" smtClean="0"/>
+              <a:t>/&gt;</a:t>
+            </a:r>
+          </a:p>
+          <a:p>
+            <a:pPr marL="118872" indent="0">
+              <a:buNone/>
+            </a:pPr>
+            <a:r>
+              <a:rPr lang="en-IE" dirty="0" smtClean="0"/>
+              <a:t>&lt;p&gt;</a:t>
+            </a:r>
+          </a:p>
+          <a:p>
+            <a:pPr marL="118872" indent="0">
+              <a:buNone/>
+            </a:pPr>
+            <a:r>
+              <a:rPr lang="en-IE" dirty="0" smtClean="0"/>
+              <a:t>&lt;</a:t>
+            </a:r>
+            <a:r>
+              <a:rPr lang="en-IE" dirty="0" err="1" smtClean="0"/>
+              <a:t>img</a:t>
+            </a:r>
+            <a:r>
+              <a:rPr lang="en-IE" dirty="0" smtClean="0"/>
+              <a:t> </a:t>
+            </a:r>
+            <a:r>
+              <a:rPr lang="en-IE" dirty="0" err="1" smtClean="0"/>
+              <a:t>src</a:t>
+            </a:r>
+            <a:r>
+              <a:rPr lang="en-IE" dirty="0" smtClean="0"/>
+              <a:t>=“</a:t>
+            </a:r>
+            <a:r>
+              <a:rPr lang="en-IE" dirty="0" err="1" smtClean="0"/>
+              <a:t>url</a:t>
+            </a:r>
+            <a:r>
+              <a:rPr lang="en-IE" dirty="0" smtClean="0"/>
+              <a:t>” /&gt;</a:t>
+            </a:r>
+          </a:p>
+          <a:p>
+            <a:pPr marL="118872" indent="0">
+              <a:buNone/>
+            </a:pPr>
+            <a:r>
+              <a:rPr lang="en-IE" dirty="0" smtClean="0"/>
+              <a:t>&lt;a </a:t>
+            </a:r>
+            <a:r>
+              <a:rPr lang="en-IE" dirty="0" err="1" smtClean="0"/>
+              <a:t>href</a:t>
+            </a:r>
+            <a:r>
+              <a:rPr lang="en-IE" dirty="0" smtClean="0"/>
+              <a:t>=“</a:t>
+            </a:r>
+            <a:r>
+              <a:rPr lang="en-IE" dirty="0" err="1" smtClean="0"/>
+              <a:t>url</a:t>
+            </a:r>
+            <a:r>
+              <a:rPr lang="en-IE" dirty="0" smtClean="0"/>
+              <a:t>”&gt; A link to another page &lt;/a&gt;</a:t>
+            </a:r>
             <a:endParaRPr lang="en-IE" dirty="0"/>
-          </a:p>
-          <a:p>
-            <a:pPr marL="118872" indent="0">
-              <a:buNone/>
-            </a:pPr>
-            <a:r>
-              <a:rPr lang="en-IE" dirty="0" smtClean="0"/>
-              <a:t>&lt;marquee&gt;Some Text&lt;/marquee&gt;</a:t>
-            </a:r>
-          </a:p>
-          <a:p>
-            <a:pPr marL="118872" indent="0">
-              <a:buNone/>
-            </a:pPr>
-            <a:endParaRPr lang="en-IE" dirty="0"/>
-          </a:p>
-          <a:p>
-            <a:pPr marL="118872" indent="0">
-              <a:buNone/>
-            </a:pPr>
-            <a:r>
-              <a:rPr lang="en-IE" dirty="0"/>
-              <a:t>d</a:t>
-            </a:r>
-            <a:r>
-              <a:rPr lang="en-IE" dirty="0" smtClean="0"/>
-              <a:t>irection=</a:t>
-            </a:r>
-            <a:r>
-              <a:rPr lang="en-IE" dirty="0" err="1" smtClean="0"/>
-              <a:t>left,right,up</a:t>
-            </a:r>
-            <a:r>
-              <a:rPr lang="en-IE" dirty="0" smtClean="0"/>
-              <a:t> or down</a:t>
-            </a:r>
-          </a:p>
-          <a:p>
-            <a:pPr marL="118872" indent="0">
-              <a:buNone/>
-            </a:pPr>
-            <a:r>
-              <a:rPr lang="en-IE" dirty="0" err="1" smtClean="0"/>
-              <a:t>scrollamount</a:t>
-            </a:r>
-            <a:r>
-              <a:rPr lang="en-IE" dirty="0" smtClean="0"/>
-              <a:t>=X (scrolls faster/slower)</a:t>
-            </a:r>
-          </a:p>
-          <a:p>
-            <a:pPr marL="118872" indent="0">
-              <a:buNone/>
-            </a:pPr>
-            <a:r>
-              <a:rPr lang="en-IE" dirty="0" err="1"/>
-              <a:t>b</a:t>
-            </a:r>
-            <a:r>
-              <a:rPr lang="en-IE" dirty="0" err="1" smtClean="0"/>
-              <a:t>gcolor</a:t>
-            </a:r>
-            <a:r>
-              <a:rPr lang="en-IE" dirty="0" smtClean="0"/>
-              <a:t>=(some colour)</a:t>
-            </a:r>
           </a:p>
         </p:txBody>
       </p:sp>
     </p:spTree>
     <p:extLst>
       <p:ext uri="{BB962C8B-B14F-4D97-AF65-F5344CB8AC3E}">
-        <p14:creationId xmlns:p14="http://schemas.microsoft.com/office/powerpoint/2010/main" val="3697065676"/>
+        <p14:creationId xmlns:p14="http://schemas.microsoft.com/office/powerpoint/2010/main" val="136623678"/>
       </p:ext>
     </p:extLst>
   </p:cSld>
@@ -6956,7 +7395,7 @@
           <a:p>
             <a:r>
               <a:rPr lang="en-IE" dirty="0" smtClean="0"/>
-              <a:t>What about some video?</a:t>
+              <a:t>Some More Tags</a:t>
             </a:r>
             <a:endParaRPr lang="en-IE" dirty="0"/>
           </a:p>
@@ -6983,48 +7422,80 @@
               <a:buNone/>
             </a:pPr>
             <a:r>
+              <a:rPr lang="en-IE" dirty="0" smtClean="0"/>
+              <a:t>Let’s add some movement</a:t>
+            </a:r>
+          </a:p>
+          <a:p>
+            <a:pPr marL="118872" indent="0">
+              <a:buNone/>
+            </a:pPr>
+            <a:endParaRPr lang="en-IE" dirty="0"/>
+          </a:p>
+          <a:p>
+            <a:pPr marL="118872" indent="0">
+              <a:buNone/>
+            </a:pPr>
+            <a:r>
+              <a:rPr lang="en-IE" dirty="0" smtClean="0"/>
+              <a:t>&lt;marquee&gt;Some Text&lt;/marquee&gt;</a:t>
+            </a:r>
+          </a:p>
+          <a:p>
+            <a:pPr marL="118872" indent="0">
+              <a:buNone/>
+            </a:pPr>
+            <a:endParaRPr lang="en-IE" dirty="0"/>
+          </a:p>
+          <a:p>
+            <a:pPr marL="118872" indent="0">
+              <a:buNone/>
+            </a:pPr>
+            <a:r>
+              <a:rPr lang="en-IE" dirty="0"/>
+              <a:t>d</a:t>
+            </a:r>
+            <a:r>
+              <a:rPr lang="en-IE" dirty="0" smtClean="0"/>
+              <a:t>irection=</a:t>
+            </a:r>
+            <a:r>
               <a:rPr lang="en-IE" dirty="0" err="1" smtClean="0"/>
-              <a:t>Youtube</a:t>
-            </a:r>
-            <a:r>
-              <a:rPr lang="en-IE" dirty="0" smtClean="0"/>
-              <a:t> makes it very easy to get the code to embed video into your page</a:t>
-            </a:r>
-          </a:p>
-          <a:p>
-            <a:r>
-              <a:rPr lang="en-IE" dirty="0" smtClean="0"/>
-              <a:t>Find a video</a:t>
-            </a:r>
-          </a:p>
-          <a:p>
-            <a:r>
-              <a:rPr lang="en-IE" dirty="0" smtClean="0"/>
-              <a:t>Click “Share” button</a:t>
-            </a:r>
-          </a:p>
-          <a:p>
-            <a:r>
-              <a:rPr lang="en-IE" dirty="0" smtClean="0"/>
-              <a:t>Click “Embed”</a:t>
-            </a:r>
-          </a:p>
-          <a:p>
-            <a:r>
-              <a:rPr lang="en-IE" dirty="0" smtClean="0"/>
-              <a:t>… copy the code it gives you onto your page</a:t>
-            </a:r>
-          </a:p>
-          <a:p>
-            <a:endParaRPr lang="en-IE" dirty="0"/>
+              <a:t>left,right,up</a:t>
+            </a:r>
+            <a:r>
+              <a:rPr lang="en-IE" dirty="0" smtClean="0"/>
+              <a:t> or down</a:t>
+            </a:r>
           </a:p>
           <a:p>
             <a:pPr marL="118872" indent="0">
               <a:buNone/>
             </a:pPr>
             <a:r>
-              <a:rPr lang="en-IE" dirty="0" smtClean="0"/>
-              <a:t>Let’s try this</a:t>
+              <a:rPr lang="en-IE" dirty="0" err="1" smtClean="0"/>
+              <a:t>scrollamount</a:t>
+            </a:r>
+            <a:r>
+              <a:rPr lang="en-IE" dirty="0" smtClean="0"/>
+              <a:t>=X (scrolls faster/slower)</a:t>
+            </a:r>
+          </a:p>
+          <a:p>
+            <a:pPr marL="118872" indent="0">
+              <a:buNone/>
+            </a:pPr>
+            <a:r>
+              <a:rPr lang="en-IE" dirty="0" err="1"/>
+              <a:t>b</a:t>
+            </a:r>
+            <a:r>
+              <a:rPr lang="en-IE" dirty="0" err="1" smtClean="0"/>
+              <a:t>gcolor</a:t>
+            </a:r>
+            <a:r>
+              <a:rPr lang="en-IE" dirty="0" smtClean="0"/>
+              <a:t>=(some colour)</a:t>
             </a:r>
           </a:p>
         </p:txBody>
@@ -7032,7 +7503,7 @@
     </p:spTree>
     <p:extLst>
       <p:ext uri="{BB962C8B-B14F-4D97-AF65-F5344CB8AC3E}">
-        <p14:creationId xmlns:p14="http://schemas.microsoft.com/office/powerpoint/2010/main" val="3253493219"/>
+        <p14:creationId xmlns:p14="http://schemas.microsoft.com/office/powerpoint/2010/main" val="3697065676"/>
       </p:ext>
     </p:extLst>
   </p:cSld>
@@ -7083,7 +7554,11 @@
           <a:p>
             <a:r>
               <a:rPr lang="en-IE" dirty="0" smtClean="0"/>
-              <a:t>Add some style</a:t>
+              <a:t>What about </a:t>
+            </a:r>
+            <a:r>
+              <a:rPr lang="en-IE" dirty="0" smtClean="0"/>
+              <a:t>a map?</a:t>
             </a:r>
             <a:endParaRPr lang="en-IE" dirty="0"/>
           </a:p>
@@ -7111,7 +7586,23 @@
             </a:pPr>
             <a:r>
               <a:rPr lang="en-IE" dirty="0" smtClean="0"/>
-              <a:t>&lt;style&gt; tag inside &lt;head&gt; is CSS</a:t>
+              <a:t>Google Maps makes </a:t>
+            </a:r>
+            <a:r>
+              <a:rPr lang="en-IE" dirty="0" smtClean="0"/>
+              <a:t>it very easy to get the code to embed </a:t>
+            </a:r>
+            <a:r>
+              <a:rPr lang="en-IE" dirty="0" smtClean="0"/>
+              <a:t>a fully working map into </a:t>
+            </a:r>
+            <a:r>
+              <a:rPr lang="en-IE" dirty="0" smtClean="0"/>
+              <a:t>your </a:t>
+            </a:r>
+            <a:r>
+              <a:rPr lang="en-IE" dirty="0" smtClean="0"/>
+              <a:t>page</a:t>
             </a:r>
           </a:p>
           <a:p>
@@ -7121,124 +7612,71 @@
             <a:endParaRPr lang="en-IE" dirty="0" smtClean="0"/>
           </a:p>
           <a:p>
+            <a:r>
+              <a:rPr lang="en-IE" dirty="0" smtClean="0"/>
+              <a:t>Go to </a:t>
+            </a:r>
+            <a:r>
+              <a:rPr lang="en-IE" dirty="0" err="1" smtClean="0"/>
+              <a:t>maps.google</a:t>
+            </a:r>
+            <a:r>
+              <a:rPr lang="en-IE" dirty="0" smtClean="0"/>
+              <a:t> com</a:t>
+            </a:r>
+          </a:p>
+          <a:p>
+            <a:r>
+              <a:rPr lang="en-IE" dirty="0" smtClean="0"/>
+              <a:t>Go to a location, enter Street View</a:t>
+            </a:r>
+            <a:endParaRPr lang="en-IE" dirty="0" smtClean="0"/>
+          </a:p>
+          <a:p>
+            <a:r>
+              <a:rPr lang="en-IE" dirty="0" smtClean="0"/>
+              <a:t>Click </a:t>
+            </a:r>
+            <a:r>
+              <a:rPr lang="en-IE" dirty="0" smtClean="0"/>
+              <a:t>“Link” </a:t>
+            </a:r>
+            <a:r>
+              <a:rPr lang="en-IE" dirty="0" smtClean="0"/>
+              <a:t>button</a:t>
+            </a:r>
+          </a:p>
+          <a:p>
+            <a:r>
+              <a:rPr lang="en-IE" dirty="0" smtClean="0"/>
+              <a:t>In the “Paste HTML to embed into website” box there is the full code required</a:t>
+            </a:r>
+            <a:endParaRPr lang="en-IE" dirty="0" smtClean="0"/>
+          </a:p>
+          <a:p>
+            <a:r>
+              <a:rPr lang="en-IE" dirty="0" smtClean="0"/>
+              <a:t>… copy the code it gives you onto your page</a:t>
+            </a:r>
+          </a:p>
+          <a:p>
+            <a:endParaRPr lang="en-IE" dirty="0"/>
+          </a:p>
+          <a:p>
             <a:pPr marL="118872" indent="0">
               <a:buNone/>
             </a:pPr>
             <a:r>
               <a:rPr lang="en-IE" dirty="0" smtClean="0"/>
-              <a:t>CSS stands for “Cascading Style Sheet”</a:t>
-            </a:r>
-          </a:p>
-          <a:p>
-            <a:pPr marL="118872" indent="0">
-              <a:buNone/>
-            </a:pPr>
-            <a:endParaRPr lang="en-IE" dirty="0" smtClean="0"/>
-          </a:p>
-          <a:p>
-            <a:r>
-              <a:rPr lang="en-IE" dirty="0" smtClean="0"/>
-              <a:t>Easily changes what your page looks like</a:t>
-            </a:r>
-          </a:p>
-          <a:p>
-            <a:r>
-              <a:rPr lang="en-IE" dirty="0" smtClean="0"/>
-              <a:t>We’ll just take a very quick look at this today</a:t>
-            </a:r>
-          </a:p>
-          <a:p>
-            <a:pPr marL="118872" indent="0">
-              <a:buNone/>
-            </a:pPr>
-            <a:endParaRPr lang="en-IE" dirty="0" smtClean="0"/>
-          </a:p>
-          <a:p>
-            <a:pPr marL="118872" indent="0">
-              <a:buNone/>
-            </a:pPr>
-            <a:r>
-              <a:rPr lang="en-IE" sz="2800" dirty="0" smtClean="0"/>
-              <a:t>Body{</a:t>
-            </a:r>
-            <a:endParaRPr lang="en-IE" sz="2800" dirty="0"/>
-          </a:p>
-          <a:p>
-            <a:pPr marL="118872" indent="0">
-              <a:buNone/>
-            </a:pPr>
-            <a:r>
-              <a:rPr lang="en-IE" sz="2800" dirty="0"/>
-              <a:t>b</a:t>
-            </a:r>
-            <a:r>
-              <a:rPr lang="en-IE" sz="2800" dirty="0" smtClean="0"/>
-              <a:t>ackground-image:</a:t>
-            </a:r>
-          </a:p>
-          <a:p>
-            <a:pPr marL="118872" indent="0">
-              <a:buNone/>
-            </a:pPr>
-            <a:r>
-              <a:rPr lang="en-IE" sz="2800" dirty="0"/>
-              <a:t>b</a:t>
-            </a:r>
-            <a:r>
-              <a:rPr lang="en-IE" sz="2800" dirty="0" smtClean="0"/>
-              <a:t>ackground-repeat:</a:t>
-            </a:r>
-          </a:p>
-          <a:p>
-            <a:pPr marL="118872" indent="0">
-              <a:buNone/>
-            </a:pPr>
-            <a:r>
-              <a:rPr lang="en-IE" sz="2800" dirty="0"/>
-              <a:t>b</a:t>
-            </a:r>
-            <a:r>
-              <a:rPr lang="en-IE" sz="2800" dirty="0" smtClean="0"/>
-              <a:t>ackground-position:</a:t>
-            </a:r>
-          </a:p>
-          <a:p>
-            <a:pPr marL="118872" indent="0">
-              <a:buNone/>
-            </a:pPr>
-            <a:r>
-              <a:rPr lang="en-IE" sz="2800" dirty="0"/>
-              <a:t>b</a:t>
-            </a:r>
-            <a:r>
-              <a:rPr lang="en-IE" sz="2800" dirty="0" smtClean="0"/>
-              <a:t>ackground-</a:t>
-            </a:r>
-            <a:r>
-              <a:rPr lang="en-IE" sz="2800" dirty="0" err="1" smtClean="0"/>
-              <a:t>color</a:t>
-            </a:r>
-            <a:r>
-              <a:rPr lang="en-IE" sz="2800" dirty="0" smtClean="0"/>
-              <a:t>:</a:t>
-            </a:r>
-          </a:p>
-          <a:p>
-            <a:pPr marL="118872" indent="0">
-              <a:buNone/>
-            </a:pPr>
-            <a:r>
-              <a:rPr lang="en-IE" sz="2800" dirty="0"/>
-              <a:t>}</a:t>
-            </a:r>
-            <a:endParaRPr lang="en-IE" sz="2800" dirty="0" smtClean="0"/>
+              <a:t>Let’s try this</a:t>
+            </a:r>
           </a:p>
         </p:txBody>
       </p:sp>
     </p:spTree>
     <p:extLst>
       <p:ext uri="{BB962C8B-B14F-4D97-AF65-F5344CB8AC3E}">
-        <p14:creationId xmlns:p14="http://schemas.microsoft.com/office/powerpoint/2010/main" val="2463035431"/>
+        <p14:creationId xmlns:p14="http://schemas.microsoft.com/office/powerpoint/2010/main" val="3253493219"/>
       </p:ext>
     </p:extLst>
   </p:cSld>
@@ -7289,7 +7727,7 @@
           <a:p>
             <a:r>
               <a:rPr lang="en-IE" dirty="0" smtClean="0"/>
-              <a:t>Publish your web page</a:t>
+              <a:t>Add some style</a:t>
             </a:r>
             <a:endParaRPr lang="en-IE" dirty="0"/>
           </a:p>
@@ -7308,7 +7746,7 @@
         <p:spPr/>
         <p:txBody>
           <a:bodyPr>
-            <a:normAutofit lnSpcReduction="10000"/>
+            <a:normAutofit fontScale="92500" lnSpcReduction="20000"/>
           </a:bodyPr>
           <a:lstStyle/>
           <a:p>
@@ -7317,7 +7755,7 @@
             </a:pPr>
             <a:r>
               <a:rPr lang="en-IE" dirty="0" smtClean="0"/>
-              <a:t>So far your web pages live on your laptops only</a:t>
+              <a:t>&lt;style&gt; tag inside &lt;head&gt; is CSS</a:t>
             </a:r>
           </a:p>
           <a:p>
@@ -7332,7 +7770,7 @@
             </a:pPr>
             <a:r>
               <a:rPr lang="en-IE" dirty="0" smtClean="0"/>
-              <a:t>“Publishing” means putting it on the internet for everyone to see</a:t>
+              <a:t>CSS stands for “Cascading Style Sheet”</a:t>
             </a:r>
           </a:p>
           <a:p>
@@ -7344,37 +7782,99 @@
           <a:p>
             <a:r>
               <a:rPr lang="en-IE" dirty="0" smtClean="0"/>
-              <a:t>Go to Mozilla Thimble</a:t>
-            </a:r>
-          </a:p>
-          <a:p>
-            <a:r>
-              <a:rPr lang="en-IE" dirty="0" smtClean="0"/>
-              <a:t>Click “Start from Scratch”</a:t>
-            </a:r>
-          </a:p>
-          <a:p>
-            <a:r>
-              <a:rPr lang="en-IE" dirty="0" smtClean="0"/>
-              <a:t>Paste your webpage code into the Editor</a:t>
-            </a:r>
-          </a:p>
-          <a:p>
-            <a:r>
-              <a:rPr lang="en-IE" dirty="0" smtClean="0"/>
-              <a:t>Click “Publish”</a:t>
-            </a:r>
-          </a:p>
-          <a:p>
-            <a:r>
-              <a:rPr lang="en-IE" dirty="0" smtClean="0"/>
-              <a:t>Copy the URL it gives you … Done!</a:t>
+              <a:t>Easily changes what your page looks like</a:t>
+            </a:r>
+          </a:p>
+          <a:p>
+            <a:r>
+              <a:rPr lang="en-IE" dirty="0" smtClean="0"/>
+              <a:t>We’ll just take a very quick look at this today</a:t>
             </a:r>
           </a:p>
           <a:p>
             <a:pPr marL="118872" indent="0">
               <a:buNone/>
             </a:pPr>
+            <a:endParaRPr lang="en-IE" dirty="0" smtClean="0"/>
+          </a:p>
+          <a:p>
+            <a:pPr marL="118872" indent="0">
+              <a:buNone/>
+            </a:pPr>
+            <a:r>
+              <a:rPr lang="en-IE" sz="2800" dirty="0" smtClean="0"/>
+              <a:t>Body{</a:t>
+            </a:r>
+            <a:endParaRPr lang="en-IE" sz="2800" dirty="0"/>
+          </a:p>
+          <a:p>
+            <a:pPr marL="118872" indent="0">
+              <a:buNone/>
+            </a:pPr>
+            <a:r>
+              <a:rPr lang="en-IE" sz="2800" dirty="0"/>
+              <a:t>b</a:t>
+            </a:r>
+            <a:r>
+              <a:rPr lang="en-IE" sz="2800" dirty="0" smtClean="0"/>
+              <a:t>ackground-image:</a:t>
+            </a:r>
+          </a:p>
+          <a:p>
+            <a:pPr marL="118872" indent="0">
+              <a:buNone/>
+            </a:pPr>
+            <a:r>
+              <a:rPr lang="en-IE" sz="2800" dirty="0"/>
+              <a:t>b</a:t>
+            </a:r>
+            <a:r>
+              <a:rPr lang="en-IE" sz="2800" dirty="0" smtClean="0"/>
+              <a:t>ackground-repeat:</a:t>
+            </a:r>
+          </a:p>
+          <a:p>
+            <a:pPr marL="118872" indent="0">
+              <a:buNone/>
+            </a:pPr>
+            <a:r>
+              <a:rPr lang="en-IE" sz="2800" dirty="0"/>
+              <a:t>b</a:t>
+            </a:r>
+            <a:r>
+              <a:rPr lang="en-IE" sz="2800" dirty="0" smtClean="0"/>
+              <a:t>ackground-position:</a:t>
+            </a:r>
+          </a:p>
+          <a:p>
+            <a:pPr marL="118872" indent="0">
+              <a:buNone/>
+            </a:pPr>
+            <a:r>
+              <a:rPr lang="en-IE" sz="2800" dirty="0"/>
+              <a:t>b</a:t>
+            </a:r>
+            <a:r>
+              <a:rPr lang="en-IE" sz="2800" dirty="0" smtClean="0"/>
+              <a:t>ackground-</a:t>
+            </a:r>
+            <a:r>
+              <a:rPr lang="en-IE" sz="2800" dirty="0" err="1" smtClean="0"/>
+              <a:t>color</a:t>
+            </a:r>
+            <a:r>
+              <a:rPr lang="en-IE" sz="2800" dirty="0" smtClean="0"/>
+              <a:t>:</a:t>
+            </a:r>
+          </a:p>
+          <a:p>
+            <a:pPr marL="118872" indent="0">
+              <a:buNone/>
+            </a:pPr>
+            <a:r>
+              <a:rPr lang="en-IE" sz="2800" dirty="0"/>
+              <a:t>}</a:t>
+            </a:r>
             <a:endParaRPr lang="en-IE" sz="2800" dirty="0" smtClean="0"/>
           </a:p>
         </p:txBody>
@@ -7382,7 +7882,7 @@
     </p:spTree>
     <p:extLst>
       <p:ext uri="{BB962C8B-B14F-4D97-AF65-F5344CB8AC3E}">
-        <p14:creationId xmlns:p14="http://schemas.microsoft.com/office/powerpoint/2010/main" val="644876182"/>
+        <p14:creationId xmlns:p14="http://schemas.microsoft.com/office/powerpoint/2010/main" val="2463035431"/>
       </p:ext>
     </p:extLst>
   </p:cSld>

</xml_diff>